<commit_message>
LabelPropagation Slides and smal CSoI Progress Report Edit
</commit_message>
<xml_diff>
--- a/LabelPropagationSlides.pptx
+++ b/LabelPropagationSlides.pptx
@@ -12,6 +12,16 @@
     <p:sldId id="259" r:id="rId6"/>
     <p:sldId id="261" r:id="rId7"/>
     <p:sldId id="262" r:id="rId8"/>
+    <p:sldId id="263" r:id="rId9"/>
+    <p:sldId id="264" r:id="rId10"/>
+    <p:sldId id="265" r:id="rId11"/>
+    <p:sldId id="266" r:id="rId12"/>
+    <p:sldId id="267" r:id="rId13"/>
+    <p:sldId id="268" r:id="rId14"/>
+    <p:sldId id="269" r:id="rId15"/>
+    <p:sldId id="270" r:id="rId16"/>
+    <p:sldId id="271" r:id="rId17"/>
+    <p:sldId id="272" r:id="rId18"/>
   </p:sldIdLst>
   <p:sldSz cx="12192000" cy="6858000"/>
   <p:notesSz cx="6858000" cy="9144000"/>
@@ -110,6 +120,11 @@
       </a:defRPr>
     </a:lvl9pPr>
   </p:defaultTextStyle>
+  <p:extLst>
+    <p:ext uri="{EFAFB233-063F-42B5-8137-9DF3F51BA10A}">
+      <p15:sldGuideLst xmlns:p15="http://schemas.microsoft.com/office/powerpoint/2012/main"/>
+    </p:ext>
+  </p:extLst>
 </p:presentation>
 </file>
 
@@ -8906,7 +8921,7 @@
           <a:p>
             <a:fld id="{6AD6EE87-EBD5-4F12-A48A-63ACA297AC8F}" type="datetimeFigureOut">
               <a:rPr lang="en-US" dirty="0"/>
-              <a:t>2/28/19</a:t>
+              <a:t>3/3/19</a:t>
             </a:fld>
             <a:endParaRPr lang="en-US" dirty="0"/>
           </a:p>
@@ -9108,7 +9123,7 @@
           <a:p>
             <a:fld id="{4CD73815-2707-4475-8F1A-B873CB631BB4}" type="datetimeFigureOut">
               <a:rPr lang="en-US" dirty="0"/>
-              <a:t>2/28/19</a:t>
+              <a:t>3/3/19</a:t>
             </a:fld>
             <a:endParaRPr lang="en-US" dirty="0"/>
           </a:p>
@@ -9283,7 +9298,7 @@
           <a:p>
             <a:fld id="{2A4AFB99-0EAB-4182-AFF8-E214C82A68F6}" type="datetimeFigureOut">
               <a:rPr lang="en-US" dirty="0"/>
-              <a:t>2/28/19</a:t>
+              <a:t>3/3/19</a:t>
             </a:fld>
             <a:endParaRPr lang="en-US" dirty="0"/>
           </a:p>
@@ -9483,7 +9498,7 @@
           <a:p>
             <a:fld id="{A5D3794B-289A-4A80-97D7-111025398D45}" type="datetimeFigureOut">
               <a:rPr lang="en-US" dirty="0"/>
-              <a:t>2/28/19</a:t>
+              <a:t>3/3/19</a:t>
             </a:fld>
             <a:endParaRPr lang="en-US" dirty="0"/>
           </a:p>
@@ -18376,7 +18391,7 @@
           <a:p>
             <a:fld id="{5A61015F-7CC6-4D0A-9D87-873EA4C304CC}" type="datetimeFigureOut">
               <a:rPr lang="en-US" dirty="0"/>
-              <a:t>2/28/19</a:t>
+              <a:t>3/3/19</a:t>
             </a:fld>
             <a:endParaRPr lang="en-US" dirty="0"/>
           </a:p>
@@ -18645,7 +18660,7 @@
           <a:p>
             <a:fld id="{93C6A301-0538-44EC-B09D-202E1042A48B}" type="datetimeFigureOut">
               <a:rPr lang="en-US" dirty="0"/>
-              <a:t>2/28/19</a:t>
+              <a:t>3/3/19</a:t>
             </a:fld>
             <a:endParaRPr lang="en-US" dirty="0"/>
           </a:p>
@@ -19038,7 +19053,7 @@
           <a:p>
             <a:fld id="{D789574A-8875-45EF-8EA2-3CAA0F7ABC4C}" type="datetimeFigureOut">
               <a:rPr lang="en-US" dirty="0"/>
-              <a:t>2/28/19</a:t>
+              <a:t>3/3/19</a:t>
             </a:fld>
             <a:endParaRPr lang="en-US" dirty="0"/>
           </a:p>
@@ -19151,7 +19166,7 @@
           <a:p>
             <a:fld id="{67EF4D4C-5367-4C26-9E2B-D8088D7FCA81}" type="datetimeFigureOut">
               <a:rPr lang="en-US" dirty="0"/>
-              <a:t>2/28/19</a:t>
+              <a:t>3/3/19</a:t>
             </a:fld>
             <a:endParaRPr lang="en-US" dirty="0"/>
           </a:p>
@@ -19241,7 +19256,7 @@
           <a:p>
             <a:fld id="{56E91E96-98B0-4413-9547-46F3504108EF}" type="datetimeFigureOut">
               <a:rPr lang="en-US" dirty="0"/>
-              <a:t>2/28/19</a:t>
+              <a:t>3/3/19</a:t>
             </a:fld>
             <a:endParaRPr lang="en-US" dirty="0"/>
           </a:p>
@@ -19526,7 +19541,7 @@
           <a:p>
             <a:fld id="{05C68B11-C5A8-448C-8CE9-B1A273C79CFC}" type="datetimeFigureOut">
               <a:rPr lang="en-US" dirty="0"/>
-              <a:t>2/28/19</a:t>
+              <a:t>3/3/19</a:t>
             </a:fld>
             <a:endParaRPr lang="en-US" dirty="0"/>
           </a:p>
@@ -19801,7 +19816,7 @@
           <a:p>
             <a:fld id="{C7616CA0-919D-4A49-9C8A-62FDFB3A5183}" type="datetimeFigureOut">
               <a:rPr lang="en-US" dirty="0"/>
-              <a:t>2/28/19</a:t>
+              <a:t>3/3/19</a:t>
             </a:fld>
             <a:endParaRPr lang="en-US" dirty="0"/>
           </a:p>
@@ -20047,7 +20062,7 @@
             <a:fld id="{90298CD5-6C1E-4009-B41F-6DF62E31D3BE}" type="datetimeFigureOut">
               <a:rPr lang="en-US" dirty="0"/>
               <a:pPr/>
-              <a:t>2/28/19</a:t>
+              <a:t>3/3/19</a:t>
             </a:fld>
             <a:endParaRPr lang="en-US" dirty="0"/>
           </a:p>
@@ -20636,6 +20651,3428 @@
 </p:sld>
 </file>
 
+<file path=ppt/slides/slide10.xml><?xml version="1.0" encoding="utf-8"?>
+<p:sld xmlns:a="http://schemas.openxmlformats.org/drawingml/2006/main" xmlns:r="http://schemas.openxmlformats.org/officeDocument/2006/relationships" xmlns:p="http://schemas.openxmlformats.org/presentationml/2006/main">
+  <p:cSld>
+    <p:spTree>
+      <p:nvGrpSpPr>
+        <p:cNvPr id="1" name=""/>
+        <p:cNvGrpSpPr/>
+        <p:nvPr/>
+      </p:nvGrpSpPr>
+      <p:grpSpPr>
+        <a:xfrm>
+          <a:off x="0" y="0"/>
+          <a:ext cx="0" cy="0"/>
+          <a:chOff x="0" y="0"/>
+          <a:chExt cx="0" cy="0"/>
+        </a:xfrm>
+      </p:grpSpPr>
+      <p:sp>
+        <p:nvSpPr>
+          <p:cNvPr id="2" name="Title 1">
+            <a:extLst>
+              <a:ext uri="{FF2B5EF4-FFF2-40B4-BE49-F238E27FC236}">
+                <a16:creationId xmlns:a16="http://schemas.microsoft.com/office/drawing/2014/main" id="{82ED0E9D-F486-4F4B-A1F7-14E9E2C965A9}"/>
+              </a:ext>
+            </a:extLst>
+          </p:cNvPr>
+          <p:cNvSpPr>
+            <a:spLocks noGrp="1"/>
+          </p:cNvSpPr>
+          <p:nvPr>
+            <p:ph type="title"/>
+          </p:nvPr>
+        </p:nvSpPr>
+        <p:spPr/>
+        <p:txBody>
+          <a:bodyPr/>
+          <a:lstStyle/>
+          <a:p>
+            <a:r>
+              <a:rPr lang="en-US" dirty="0"/>
+              <a:t>Label Propagation as Optimization</a:t>
+            </a:r>
+          </a:p>
+        </p:txBody>
+      </p:sp>
+      <mc:AlternateContent xmlns:mc="http://schemas.openxmlformats.org/markup-compatibility/2006">
+        <mc:Choice xmlns:a14="http://schemas.microsoft.com/office/drawing/2010/main" Requires="a14">
+          <p:sp>
+            <p:nvSpPr>
+              <p:cNvPr id="3" name="Content Placeholder 2">
+                <a:extLst>
+                  <a:ext uri="{FF2B5EF4-FFF2-40B4-BE49-F238E27FC236}">
+                    <a16:creationId xmlns:a16="http://schemas.microsoft.com/office/drawing/2014/main" id="{D05694A3-A5E1-E145-BF89-2ACB7244681D}"/>
+                  </a:ext>
+                </a:extLst>
+              </p:cNvPr>
+              <p:cNvSpPr>
+                <a:spLocks noGrp="1"/>
+              </p:cNvSpPr>
+              <p:nvPr>
+                <p:ph idx="1"/>
+              </p:nvPr>
+            </p:nvSpPr>
+            <p:spPr>
+              <a:xfrm>
+                <a:off x="1024128" y="1870364"/>
+                <a:ext cx="9720073" cy="4438996"/>
+              </a:xfrm>
+            </p:spPr>
+            <p:txBody>
+              <a:bodyPr>
+                <a:normAutofit/>
+              </a:bodyPr>
+              <a:lstStyle/>
+              <a:p>
+                <a:r>
+                  <a:rPr lang="en-US" dirty="0"/>
+                  <a:t>Label propagation can be viewed as a local optimization method for maximizing the following objective function</a:t>
+                </a:r>
+              </a:p>
+              <a:p>
+                <a:pPr algn="ctr"/>
+                <a14:m>
+                  <m:oMath xmlns:m="http://schemas.openxmlformats.org/officeDocument/2006/math">
+                    <m:r>
+                      <a:rPr lang="en-US" b="0" i="1" smtClean="0">
+                        <a:latin typeface="Cambria Math" panose="02040503050406030204" pitchFamily="18" charset="0"/>
+                      </a:rPr>
+                      <m:t>𝐹</m:t>
+                    </m:r>
+                    <m:d>
+                      <m:dPr>
+                        <m:ctrlPr>
+                          <a:rPr lang="en-US" b="0" i="1" smtClean="0">
+                            <a:latin typeface="Cambria Math" panose="02040503050406030204" pitchFamily="18" charset="0"/>
+                          </a:rPr>
+                        </m:ctrlPr>
+                      </m:dPr>
+                      <m:e>
+                        <m:d>
+                          <m:dPr>
+                            <m:begChr m:val="{"/>
+                            <m:endChr m:val="}"/>
+                            <m:ctrlPr>
+                              <a:rPr lang="en-US" b="0" i="1" smtClean="0">
+                                <a:latin typeface="Cambria Math" panose="02040503050406030204" pitchFamily="18" charset="0"/>
+                              </a:rPr>
+                            </m:ctrlPr>
+                          </m:dPr>
+                          <m:e>
+                            <m:r>
+                              <a:rPr lang="en-US" b="0" i="1" smtClean="0">
+                                <a:latin typeface="Cambria Math" panose="02040503050406030204" pitchFamily="18" charset="0"/>
+                              </a:rPr>
+                              <m:t>𝑔</m:t>
+                            </m:r>
+                          </m:e>
+                        </m:d>
+                      </m:e>
+                    </m:d>
+                    <m:r>
+                      <a:rPr lang="en-US" b="0" i="1" smtClean="0">
+                        <a:latin typeface="Cambria Math" panose="02040503050406030204" pitchFamily="18" charset="0"/>
+                      </a:rPr>
+                      <m:t>=</m:t>
+                    </m:r>
+                    <m:nary>
+                      <m:naryPr>
+                        <m:chr m:val="∑"/>
+                        <m:supHide m:val="on"/>
+                        <m:ctrlPr>
+                          <a:rPr lang="en-US" b="0" i="1" smtClean="0">
+                            <a:latin typeface="Cambria Math" panose="02040503050406030204" pitchFamily="18" charset="0"/>
+                          </a:rPr>
+                        </m:ctrlPr>
+                      </m:naryPr>
+                      <m:sub>
+                        <m:d>
+                          <m:dPr>
+                            <m:begChr m:val="{"/>
+                            <m:endChr m:val="}"/>
+                            <m:ctrlPr>
+                              <a:rPr lang="en-US" b="0" i="1" smtClean="0">
+                                <a:latin typeface="Cambria Math" panose="02040503050406030204" pitchFamily="18" charset="0"/>
+                              </a:rPr>
+                            </m:ctrlPr>
+                          </m:dPr>
+                          <m:e>
+                            <m:r>
+                              <a:rPr lang="en-US" b="0" i="1" smtClean="0">
+                                <a:latin typeface="Cambria Math" panose="02040503050406030204" pitchFamily="18" charset="0"/>
+                              </a:rPr>
+                              <m:t>𝑖</m:t>
+                            </m:r>
+                            <m:r>
+                              <a:rPr lang="en-US" b="0" i="1" smtClean="0">
+                                <a:latin typeface="Cambria Math" panose="02040503050406030204" pitchFamily="18" charset="0"/>
+                              </a:rPr>
+                              <m:t>,</m:t>
+                            </m:r>
+                            <m:r>
+                              <a:rPr lang="en-US" b="0" i="1" smtClean="0">
+                                <a:latin typeface="Cambria Math" panose="02040503050406030204" pitchFamily="18" charset="0"/>
+                              </a:rPr>
+                              <m:t>𝑗</m:t>
+                            </m:r>
+                          </m:e>
+                        </m:d>
+                      </m:sub>
+                      <m:sup/>
+                      <m:e>
+                        <m:sSub>
+                          <m:sSubPr>
+                            <m:ctrlPr>
+                              <a:rPr lang="en-US" b="0" i="1" smtClean="0">
+                                <a:latin typeface="Cambria Math" panose="02040503050406030204" pitchFamily="18" charset="0"/>
+                              </a:rPr>
+                            </m:ctrlPr>
+                          </m:sSubPr>
+                          <m:e>
+                            <m:r>
+                              <a:rPr lang="en-US" b="0" i="1" smtClean="0">
+                                <a:latin typeface="Cambria Math" panose="02040503050406030204" pitchFamily="18" charset="0"/>
+                              </a:rPr>
+                              <m:t>𝐴</m:t>
+                            </m:r>
+                          </m:e>
+                          <m:sub>
+                            <m:r>
+                              <a:rPr lang="en-US" b="0" i="1" smtClean="0">
+                                <a:latin typeface="Cambria Math" panose="02040503050406030204" pitchFamily="18" charset="0"/>
+                              </a:rPr>
+                              <m:t>𝑖</m:t>
+                            </m:r>
+                            <m:r>
+                              <a:rPr lang="en-US" b="0" i="1" smtClean="0">
+                                <a:latin typeface="Cambria Math" panose="02040503050406030204" pitchFamily="18" charset="0"/>
+                              </a:rPr>
+                              <m:t>,</m:t>
+                            </m:r>
+                            <m:r>
+                              <a:rPr lang="en-US" b="0" i="1" smtClean="0">
+                                <a:latin typeface="Cambria Math" panose="02040503050406030204" pitchFamily="18" charset="0"/>
+                              </a:rPr>
+                              <m:t>𝑗</m:t>
+                            </m:r>
+                          </m:sub>
+                        </m:sSub>
+                        <m:r>
+                          <a:rPr lang="en-US" b="0" i="1" smtClean="0">
+                            <a:latin typeface="Cambria Math" panose="02040503050406030204" pitchFamily="18" charset="0"/>
+                          </a:rPr>
+                          <m:t> </m:t>
+                        </m:r>
+                        <m:r>
+                          <a:rPr lang="en-US" b="0" i="1" smtClean="0">
+                            <a:latin typeface="Cambria Math" panose="02040503050406030204" pitchFamily="18" charset="0"/>
+                          </a:rPr>
+                          <m:t>𝛿</m:t>
+                        </m:r>
+                        <m:r>
+                          <a:rPr lang="en-US" b="0" i="1" smtClean="0">
+                            <a:latin typeface="Cambria Math" panose="02040503050406030204" pitchFamily="18" charset="0"/>
+                          </a:rPr>
+                          <m:t>(</m:t>
+                        </m:r>
+                        <m:sSub>
+                          <m:sSubPr>
+                            <m:ctrlPr>
+                              <a:rPr lang="en-US" b="0" i="1" smtClean="0">
+                                <a:latin typeface="Cambria Math" panose="02040503050406030204" pitchFamily="18" charset="0"/>
+                              </a:rPr>
+                            </m:ctrlPr>
+                          </m:sSubPr>
+                          <m:e>
+                            <m:r>
+                              <a:rPr lang="en-US" b="0" i="1" smtClean="0">
+                                <a:latin typeface="Cambria Math" panose="02040503050406030204" pitchFamily="18" charset="0"/>
+                              </a:rPr>
+                              <m:t>𝑔</m:t>
+                            </m:r>
+                          </m:e>
+                          <m:sub>
+                            <m:r>
+                              <a:rPr lang="en-US" b="0" i="1" smtClean="0">
+                                <a:latin typeface="Cambria Math" panose="02040503050406030204" pitchFamily="18" charset="0"/>
+                              </a:rPr>
+                              <m:t>𝑖</m:t>
+                            </m:r>
+                          </m:sub>
+                        </m:sSub>
+                        <m:r>
+                          <a:rPr lang="en-US" b="0" i="1" smtClean="0">
+                            <a:latin typeface="Cambria Math" panose="02040503050406030204" pitchFamily="18" charset="0"/>
+                          </a:rPr>
+                          <m:t>, </m:t>
+                        </m:r>
+                        <m:sSub>
+                          <m:sSubPr>
+                            <m:ctrlPr>
+                              <a:rPr lang="en-US" b="0" i="1" smtClean="0">
+                                <a:latin typeface="Cambria Math" panose="02040503050406030204" pitchFamily="18" charset="0"/>
+                              </a:rPr>
+                            </m:ctrlPr>
+                          </m:sSubPr>
+                          <m:e>
+                            <m:r>
+                              <a:rPr lang="en-US" b="0" i="1" smtClean="0">
+                                <a:latin typeface="Cambria Math" panose="02040503050406030204" pitchFamily="18" charset="0"/>
+                              </a:rPr>
+                              <m:t>𝑔</m:t>
+                            </m:r>
+                          </m:e>
+                          <m:sub>
+                            <m:r>
+                              <a:rPr lang="en-US" b="0" i="1" smtClean="0">
+                                <a:latin typeface="Cambria Math" panose="02040503050406030204" pitchFamily="18" charset="0"/>
+                              </a:rPr>
+                              <m:t>𝑗</m:t>
+                            </m:r>
+                          </m:sub>
+                        </m:sSub>
+                        <m:r>
+                          <a:rPr lang="en-US" b="0" i="1" smtClean="0">
+                            <a:latin typeface="Cambria Math" panose="02040503050406030204" pitchFamily="18" charset="0"/>
+                          </a:rPr>
+                          <m:t>)</m:t>
+                        </m:r>
+                      </m:e>
+                    </m:nary>
+                  </m:oMath>
+                </a14:m>
+                <a:endParaRPr lang="en-US" b="0" dirty="0"/>
+              </a:p>
+              <a:p>
+                <a:r>
+                  <a:rPr lang="en-US" dirty="0"/>
+                  <a:t>Where </a:t>
+                </a:r>
+                <a14:m>
+                  <m:oMath xmlns:m="http://schemas.openxmlformats.org/officeDocument/2006/math">
+                    <m:r>
+                      <m:rPr>
+                        <m:lit/>
+                      </m:rPr>
+                      <a:rPr lang="en-US" b="0" i="1" smtClean="0">
+                        <a:latin typeface="Cambria Math" panose="02040503050406030204" pitchFamily="18" charset="0"/>
+                      </a:rPr>
+                      <m:t>{</m:t>
+                    </m:r>
+                    <m:r>
+                      <a:rPr lang="en-US" b="0" i="1" smtClean="0">
+                        <a:latin typeface="Cambria Math" panose="02040503050406030204" pitchFamily="18" charset="0"/>
+                      </a:rPr>
+                      <m:t>𝑔</m:t>
+                    </m:r>
+                    <m:r>
+                      <m:rPr>
+                        <m:lit/>
+                      </m:rPr>
+                      <a:rPr lang="en-US" b="0" i="1" smtClean="0">
+                        <a:latin typeface="Cambria Math" panose="02040503050406030204" pitchFamily="18" charset="0"/>
+                      </a:rPr>
+                      <m:t>}</m:t>
+                    </m:r>
+                  </m:oMath>
+                </a14:m>
+                <a:r>
+                  <a:rPr lang="en-US" dirty="0"/>
+                  <a:t> is the group labeling of the network. This objective has a trivial optimum solution corresponding to a uniform labeling, i.e. all nodes sharing the same label. However, label propagation usually finds and gets stuck in a local optima that is not the undesirable global optimum.</a:t>
+                </a:r>
+              </a:p>
+              <a:p>
+                <a:endParaRPr lang="en-US" dirty="0"/>
+              </a:p>
+              <a:p>
+                <a:r>
+                  <a:rPr lang="en-US" dirty="0"/>
+                  <a:t>Label propagation as optimization is equivalent to minimizing the Hamiltonian of a q-state Potts model, a generalization of the </a:t>
+                </a:r>
+                <a:r>
+                  <a:rPr lang="en-US" dirty="0" err="1"/>
+                  <a:t>Ising</a:t>
+                </a:r>
+                <a:r>
+                  <a:rPr lang="en-US" dirty="0"/>
+                  <a:t> model.</a:t>
+                </a:r>
+              </a:p>
+              <a:p>
+                <a:pPr algn="ctr"/>
+                <a:r>
+                  <a:rPr lang="en-US" dirty="0"/>
+                  <a:t> </a:t>
+                </a:r>
+                <a14:m>
+                  <m:oMath xmlns:m="http://schemas.openxmlformats.org/officeDocument/2006/math">
+                    <m:r>
+                      <a:rPr lang="en-US" b="0" i="1" smtClean="0">
+                        <a:latin typeface="Cambria Math" panose="02040503050406030204" pitchFamily="18" charset="0"/>
+                      </a:rPr>
+                      <m:t>𝐻</m:t>
+                    </m:r>
+                    <m:d>
+                      <m:dPr>
+                        <m:ctrlPr>
+                          <a:rPr lang="en-US" b="0" i="1" smtClean="0">
+                            <a:latin typeface="Cambria Math" panose="02040503050406030204" pitchFamily="18" charset="0"/>
+                          </a:rPr>
+                        </m:ctrlPr>
+                      </m:dPr>
+                      <m:e>
+                        <m:d>
+                          <m:dPr>
+                            <m:begChr m:val="{"/>
+                            <m:endChr m:val="}"/>
+                            <m:ctrlPr>
+                              <a:rPr lang="en-US" b="0" i="1" smtClean="0">
+                                <a:latin typeface="Cambria Math" panose="02040503050406030204" pitchFamily="18" charset="0"/>
+                              </a:rPr>
+                            </m:ctrlPr>
+                          </m:dPr>
+                          <m:e>
+                            <m:r>
+                              <a:rPr lang="en-US" b="0" i="1" smtClean="0">
+                                <a:latin typeface="Cambria Math" panose="02040503050406030204" pitchFamily="18" charset="0"/>
+                              </a:rPr>
+                              <m:t>𝜎</m:t>
+                            </m:r>
+                          </m:e>
+                        </m:d>
+                      </m:e>
+                    </m:d>
+                    <m:r>
+                      <a:rPr lang="en-US" b="0" i="1" smtClean="0">
+                        <a:latin typeface="Cambria Math" panose="02040503050406030204" pitchFamily="18" charset="0"/>
+                      </a:rPr>
+                      <m:t>=−</m:t>
+                    </m:r>
+                    <m:nary>
+                      <m:naryPr>
+                        <m:chr m:val="∑"/>
+                        <m:supHide m:val="on"/>
+                        <m:ctrlPr>
+                          <a:rPr lang="en-US" b="0" i="1" smtClean="0">
+                            <a:latin typeface="Cambria Math" panose="02040503050406030204" pitchFamily="18" charset="0"/>
+                          </a:rPr>
+                        </m:ctrlPr>
+                      </m:naryPr>
+                      <m:sub>
+                        <m:d>
+                          <m:dPr>
+                            <m:begChr m:val="{"/>
+                            <m:endChr m:val="}"/>
+                            <m:ctrlPr>
+                              <a:rPr lang="en-US" b="0" i="1" smtClean="0">
+                                <a:latin typeface="Cambria Math" panose="02040503050406030204" pitchFamily="18" charset="0"/>
+                              </a:rPr>
+                            </m:ctrlPr>
+                          </m:dPr>
+                          <m:e>
+                            <m:r>
+                              <a:rPr lang="en-US" b="0" i="1" smtClean="0">
+                                <a:latin typeface="Cambria Math" panose="02040503050406030204" pitchFamily="18" charset="0"/>
+                              </a:rPr>
+                              <m:t>𝑖</m:t>
+                            </m:r>
+                            <m:r>
+                              <a:rPr lang="en-US" b="0" i="1" smtClean="0">
+                                <a:latin typeface="Cambria Math" panose="02040503050406030204" pitchFamily="18" charset="0"/>
+                              </a:rPr>
+                              <m:t>,</m:t>
+                            </m:r>
+                            <m:r>
+                              <a:rPr lang="en-US" b="0" i="1" smtClean="0">
+                                <a:latin typeface="Cambria Math" panose="02040503050406030204" pitchFamily="18" charset="0"/>
+                              </a:rPr>
+                              <m:t>𝑗</m:t>
+                            </m:r>
+                          </m:e>
+                        </m:d>
+                      </m:sub>
+                      <m:sup/>
+                      <m:e>
+                        <m:sSub>
+                          <m:sSubPr>
+                            <m:ctrlPr>
+                              <a:rPr lang="en-US" b="0" i="1" smtClean="0">
+                                <a:latin typeface="Cambria Math" panose="02040503050406030204" pitchFamily="18" charset="0"/>
+                              </a:rPr>
+                            </m:ctrlPr>
+                          </m:sSubPr>
+                          <m:e>
+                            <m:r>
+                              <a:rPr lang="en-US" b="0" i="1" smtClean="0">
+                                <a:latin typeface="Cambria Math" panose="02040503050406030204" pitchFamily="18" charset="0"/>
+                              </a:rPr>
+                              <m:t>𝐴</m:t>
+                            </m:r>
+                          </m:e>
+                          <m:sub>
+                            <m:d>
+                              <m:dPr>
+                                <m:begChr m:val="{"/>
+                                <m:endChr m:val="}"/>
+                                <m:ctrlPr>
+                                  <a:rPr lang="en-US" b="0" i="1" smtClean="0">
+                                    <a:latin typeface="Cambria Math" panose="02040503050406030204" pitchFamily="18" charset="0"/>
+                                  </a:rPr>
+                                </m:ctrlPr>
+                              </m:dPr>
+                              <m:e>
+                                <m:r>
+                                  <a:rPr lang="en-US" b="0" i="1" smtClean="0">
+                                    <a:latin typeface="Cambria Math" panose="02040503050406030204" pitchFamily="18" charset="0"/>
+                                  </a:rPr>
+                                  <m:t>𝑖</m:t>
+                                </m:r>
+                                <m:r>
+                                  <a:rPr lang="en-US" b="0" i="1" smtClean="0">
+                                    <a:latin typeface="Cambria Math" panose="02040503050406030204" pitchFamily="18" charset="0"/>
+                                  </a:rPr>
+                                  <m:t>,</m:t>
+                                </m:r>
+                                <m:r>
+                                  <a:rPr lang="en-US" b="0" i="1" smtClean="0">
+                                    <a:latin typeface="Cambria Math" panose="02040503050406030204" pitchFamily="18" charset="0"/>
+                                  </a:rPr>
+                                  <m:t>𝑗</m:t>
+                                </m:r>
+                              </m:e>
+                            </m:d>
+                          </m:sub>
+                        </m:sSub>
+                        <m:r>
+                          <a:rPr lang="en-US" b="0" i="1" smtClean="0">
+                            <a:latin typeface="Cambria Math" panose="02040503050406030204" pitchFamily="18" charset="0"/>
+                          </a:rPr>
+                          <m:t>𝛿</m:t>
+                        </m:r>
+                        <m:r>
+                          <a:rPr lang="en-US" b="0" i="1" smtClean="0">
+                            <a:latin typeface="Cambria Math" panose="02040503050406030204" pitchFamily="18" charset="0"/>
+                          </a:rPr>
+                          <m:t>(</m:t>
+                        </m:r>
+                        <m:sSub>
+                          <m:sSubPr>
+                            <m:ctrlPr>
+                              <a:rPr lang="en-US" b="0" i="1" smtClean="0">
+                                <a:latin typeface="Cambria Math" panose="02040503050406030204" pitchFamily="18" charset="0"/>
+                              </a:rPr>
+                            </m:ctrlPr>
+                          </m:sSubPr>
+                          <m:e>
+                            <m:r>
+                              <a:rPr lang="en-US" b="0" i="1" smtClean="0">
+                                <a:latin typeface="Cambria Math" panose="02040503050406030204" pitchFamily="18" charset="0"/>
+                              </a:rPr>
+                              <m:t>𝜎</m:t>
+                            </m:r>
+                          </m:e>
+                          <m:sub>
+                            <m:r>
+                              <a:rPr lang="en-US" b="0" i="1" smtClean="0">
+                                <a:latin typeface="Cambria Math" panose="02040503050406030204" pitchFamily="18" charset="0"/>
+                              </a:rPr>
+                              <m:t>𝑖</m:t>
+                            </m:r>
+                          </m:sub>
+                        </m:sSub>
+                        <m:r>
+                          <a:rPr lang="en-US" b="0" i="1" smtClean="0">
+                            <a:latin typeface="Cambria Math" panose="02040503050406030204" pitchFamily="18" charset="0"/>
+                          </a:rPr>
+                          <m:t>,</m:t>
+                        </m:r>
+                        <m:sSub>
+                          <m:sSubPr>
+                            <m:ctrlPr>
+                              <a:rPr lang="en-US" b="0" i="1" smtClean="0">
+                                <a:latin typeface="Cambria Math" panose="02040503050406030204" pitchFamily="18" charset="0"/>
+                              </a:rPr>
+                            </m:ctrlPr>
+                          </m:sSubPr>
+                          <m:e>
+                            <m:r>
+                              <a:rPr lang="en-US" b="0" i="1" smtClean="0">
+                                <a:latin typeface="Cambria Math" panose="02040503050406030204" pitchFamily="18" charset="0"/>
+                              </a:rPr>
+                              <m:t>𝜎</m:t>
+                            </m:r>
+                          </m:e>
+                          <m:sub>
+                            <m:r>
+                              <a:rPr lang="en-US" b="0" i="1" smtClean="0">
+                                <a:latin typeface="Cambria Math" panose="02040503050406030204" pitchFamily="18" charset="0"/>
+                              </a:rPr>
+                              <m:t>𝑗</m:t>
+                            </m:r>
+                          </m:sub>
+                        </m:sSub>
+                        <m:r>
+                          <a:rPr lang="en-US" b="0" i="1" smtClean="0">
+                            <a:latin typeface="Cambria Math" panose="02040503050406030204" pitchFamily="18" charset="0"/>
+                          </a:rPr>
+                          <m:t>)</m:t>
+                        </m:r>
+                      </m:e>
+                    </m:nary>
+                  </m:oMath>
+                </a14:m>
+                <a:endParaRPr lang="en-US" dirty="0"/>
+              </a:p>
+            </p:txBody>
+          </p:sp>
+        </mc:Choice>
+        <mc:Fallback>
+          <p:sp>
+            <p:nvSpPr>
+              <p:cNvPr id="3" name="Content Placeholder 2">
+                <a:extLst>
+                  <a:ext uri="{FF2B5EF4-FFF2-40B4-BE49-F238E27FC236}">
+                    <a16:creationId xmlns:a16="http://schemas.microsoft.com/office/drawing/2014/main" id="{D05694A3-A5E1-E145-BF89-2ACB7244681D}"/>
+                  </a:ext>
+                </a:extLst>
+              </p:cNvPr>
+              <p:cNvSpPr>
+                <a:spLocks noGrp="1" noRot="1" noChangeAspect="1" noMove="1" noResize="1" noEditPoints="1" noAdjustHandles="1" noChangeArrowheads="1" noChangeShapeType="1" noTextEdit="1"/>
+              </p:cNvSpPr>
+              <p:nvPr>
+                <p:ph idx="1"/>
+              </p:nvPr>
+            </p:nvSpPr>
+            <p:spPr>
+              <a:xfrm>
+                <a:off x="1024128" y="1870364"/>
+                <a:ext cx="9720073" cy="4438996"/>
+              </a:xfrm>
+              <a:blipFill>
+                <a:blip r:embed="rId2"/>
+                <a:stretch>
+                  <a:fillRect l="-261" t="-1425" r="-783" b="-16239"/>
+                </a:stretch>
+              </a:blipFill>
+            </p:spPr>
+            <p:txBody>
+              <a:bodyPr/>
+              <a:lstStyle/>
+              <a:p>
+                <a:r>
+                  <a:rPr lang="en-US">
+                    <a:noFill/>
+                  </a:rPr>
+                  <a:t> </a:t>
+                </a:r>
+              </a:p>
+            </p:txBody>
+          </p:sp>
+        </mc:Fallback>
+      </mc:AlternateContent>
+    </p:spTree>
+    <p:extLst>
+      <p:ext uri="{BB962C8B-B14F-4D97-AF65-F5344CB8AC3E}">
+        <p14:creationId xmlns:p14="http://schemas.microsoft.com/office/powerpoint/2010/main" val="1601691391"/>
+      </p:ext>
+    </p:extLst>
+  </p:cSld>
+  <p:clrMapOvr>
+    <a:masterClrMapping/>
+  </p:clrMapOvr>
+</p:sld>
+</file>
+
+<file path=ppt/slides/slide11.xml><?xml version="1.0" encoding="utf-8"?>
+<p:sld xmlns:a="http://schemas.openxmlformats.org/drawingml/2006/main" xmlns:r="http://schemas.openxmlformats.org/officeDocument/2006/relationships" xmlns:p="http://schemas.openxmlformats.org/presentationml/2006/main">
+  <p:cSld>
+    <p:spTree>
+      <p:nvGrpSpPr>
+        <p:cNvPr id="1" name=""/>
+        <p:cNvGrpSpPr/>
+        <p:nvPr/>
+      </p:nvGrpSpPr>
+      <p:grpSpPr>
+        <a:xfrm>
+          <a:off x="0" y="0"/>
+          <a:ext cx="0" cy="0"/>
+          <a:chOff x="0" y="0"/>
+          <a:chExt cx="0" cy="0"/>
+        </a:xfrm>
+      </p:grpSpPr>
+      <p:sp>
+        <p:nvSpPr>
+          <p:cNvPr id="2" name="Title 1">
+            <a:extLst>
+              <a:ext uri="{FF2B5EF4-FFF2-40B4-BE49-F238E27FC236}">
+                <a16:creationId xmlns:a16="http://schemas.microsoft.com/office/drawing/2014/main" id="{F1C4EDE0-EA8B-2648-9380-8D1BA8603F3A}"/>
+              </a:ext>
+            </a:extLst>
+          </p:cNvPr>
+          <p:cNvSpPr>
+            <a:spLocks noGrp="1"/>
+          </p:cNvSpPr>
+          <p:nvPr>
+            <p:ph type="title"/>
+          </p:nvPr>
+        </p:nvSpPr>
+        <p:spPr/>
+        <p:txBody>
+          <a:bodyPr/>
+          <a:lstStyle/>
+          <a:p>
+            <a:r>
+              <a:rPr lang="en-US" dirty="0"/>
+              <a:t>Advances of Label Propagation</a:t>
+            </a:r>
+          </a:p>
+        </p:txBody>
+      </p:sp>
+      <mc:AlternateContent xmlns:mc="http://schemas.openxmlformats.org/markup-compatibility/2006">
+        <mc:Choice xmlns:a14="http://schemas.microsoft.com/office/drawing/2010/main" Requires="a14">
+          <p:sp>
+            <p:nvSpPr>
+              <p:cNvPr id="3" name="Content Placeholder 2">
+                <a:extLst>
+                  <a:ext uri="{FF2B5EF4-FFF2-40B4-BE49-F238E27FC236}">
+                    <a16:creationId xmlns:a16="http://schemas.microsoft.com/office/drawing/2014/main" id="{AA239E47-1A7C-D845-8AE5-008820DB3F24}"/>
+                  </a:ext>
+                </a:extLst>
+              </p:cNvPr>
+              <p:cNvSpPr>
+                <a:spLocks noGrp="1"/>
+              </p:cNvSpPr>
+              <p:nvPr>
+                <p:ph idx="1"/>
+              </p:nvPr>
+            </p:nvSpPr>
+            <p:spPr/>
+            <p:txBody>
+              <a:bodyPr/>
+              <a:lstStyle/>
+              <a:p>
+                <a:r>
+                  <a:rPr lang="en-US" dirty="0"/>
+                  <a:t>Problem: As stated, there is an undesirable optimal solution to the original label propagation method.</a:t>
+                </a:r>
+              </a:p>
+              <a:p>
+                <a:r>
+                  <a:rPr lang="en-US" dirty="0"/>
+                  <a:t>Solution: Add constraints to make the objective function. Let </a:t>
+                </a:r>
+                <a14:m>
+                  <m:oMath xmlns:m="http://schemas.openxmlformats.org/officeDocument/2006/math">
+                    <m:r>
+                      <a:rPr lang="en-US" b="0" i="1" smtClean="0">
+                        <a:latin typeface="Cambria Math" panose="02040503050406030204" pitchFamily="18" charset="0"/>
+                      </a:rPr>
+                      <m:t>𝐻</m:t>
+                    </m:r>
+                  </m:oMath>
+                </a14:m>
+                <a:r>
+                  <a:rPr lang="en-US" dirty="0"/>
+                  <a:t> be the original objective function, then the modified objective function with the constraints is </a:t>
+                </a:r>
+              </a:p>
+              <a:p>
+                <a:pPr algn="ctr"/>
+                <a14:m>
+                  <m:oMath xmlns:m="http://schemas.openxmlformats.org/officeDocument/2006/math">
+                    <m:r>
+                      <a:rPr lang="en-US" b="0" i="1" smtClean="0">
+                        <a:latin typeface="Cambria Math" panose="02040503050406030204" pitchFamily="18" charset="0"/>
+                      </a:rPr>
+                      <m:t>𝐻</m:t>
+                    </m:r>
+                    <m:r>
+                      <a:rPr lang="en-US" b="0" i="1" smtClean="0">
+                        <a:latin typeface="Cambria Math" panose="02040503050406030204" pitchFamily="18" charset="0"/>
+                      </a:rPr>
+                      <m:t>+</m:t>
+                    </m:r>
+                    <m:r>
+                      <a:rPr lang="en-US" b="0" i="1" smtClean="0">
+                        <a:latin typeface="Cambria Math" panose="02040503050406030204" pitchFamily="18" charset="0"/>
+                      </a:rPr>
+                      <m:t>𝜆</m:t>
+                    </m:r>
+                    <m:r>
+                      <a:rPr lang="en-US" b="0" i="1" smtClean="0">
+                        <a:latin typeface="Cambria Math" panose="02040503050406030204" pitchFamily="18" charset="0"/>
+                      </a:rPr>
+                      <m:t>𝐺</m:t>
+                    </m:r>
+                  </m:oMath>
+                </a14:m>
+                <a:endParaRPr lang="en-US" dirty="0"/>
+              </a:p>
+              <a:p>
+                <a:r>
+                  <a:rPr lang="en-US" dirty="0"/>
+                  <a:t>Where </a:t>
+                </a:r>
+                <a14:m>
+                  <m:oMath xmlns:m="http://schemas.openxmlformats.org/officeDocument/2006/math">
+                    <m:r>
+                      <a:rPr lang="en-US" b="0" i="1" smtClean="0">
+                        <a:latin typeface="Cambria Math" panose="02040503050406030204" pitchFamily="18" charset="0"/>
+                      </a:rPr>
+                      <m:t>𝐺</m:t>
+                    </m:r>
+                  </m:oMath>
+                </a14:m>
+                <a:r>
+                  <a:rPr lang="en-US" dirty="0"/>
+                  <a:t> represents a penalty term with </a:t>
+                </a:r>
+                <a14:m>
+                  <m:oMath xmlns:m="http://schemas.openxmlformats.org/officeDocument/2006/math">
+                    <m:r>
+                      <a:rPr lang="en-US" b="0" i="1" smtClean="0">
+                        <a:latin typeface="Cambria Math" panose="02040503050406030204" pitchFamily="18" charset="0"/>
+                      </a:rPr>
+                      <m:t>𝜆</m:t>
+                    </m:r>
+                  </m:oMath>
+                </a14:m>
+                <a:r>
+                  <a:rPr lang="en-US" dirty="0"/>
+                  <a:t> being a regularization parameter weighing the penalty. </a:t>
+                </a:r>
+              </a:p>
+            </p:txBody>
+          </p:sp>
+        </mc:Choice>
+        <mc:Fallback>
+          <p:sp>
+            <p:nvSpPr>
+              <p:cNvPr id="3" name="Content Placeholder 2">
+                <a:extLst>
+                  <a:ext uri="{FF2B5EF4-FFF2-40B4-BE49-F238E27FC236}">
+                    <a16:creationId xmlns:a16="http://schemas.microsoft.com/office/drawing/2014/main" id="{AA239E47-1A7C-D845-8AE5-008820DB3F24}"/>
+                  </a:ext>
+                </a:extLst>
+              </p:cNvPr>
+              <p:cNvSpPr>
+                <a:spLocks noGrp="1" noRot="1" noChangeAspect="1" noMove="1" noResize="1" noEditPoints="1" noAdjustHandles="1" noChangeArrowheads="1" noChangeShapeType="1" noTextEdit="1"/>
+              </p:cNvSpPr>
+              <p:nvPr>
+                <p:ph idx="1"/>
+              </p:nvPr>
+            </p:nvSpPr>
+            <p:spPr>
+              <a:blipFill>
+                <a:blip r:embed="rId2"/>
+                <a:stretch>
+                  <a:fillRect l="-261" t="-2208"/>
+                </a:stretch>
+              </a:blipFill>
+            </p:spPr>
+            <p:txBody>
+              <a:bodyPr/>
+              <a:lstStyle/>
+              <a:p>
+                <a:r>
+                  <a:rPr lang="en-US">
+                    <a:noFill/>
+                  </a:rPr>
+                  <a:t> </a:t>
+                </a:r>
+              </a:p>
+            </p:txBody>
+          </p:sp>
+        </mc:Fallback>
+      </mc:AlternateContent>
+    </p:spTree>
+    <p:extLst>
+      <p:ext uri="{BB962C8B-B14F-4D97-AF65-F5344CB8AC3E}">
+        <p14:creationId xmlns:p14="http://schemas.microsoft.com/office/powerpoint/2010/main" val="2567020867"/>
+      </p:ext>
+    </p:extLst>
+  </p:cSld>
+  <p:clrMapOvr>
+    <a:masterClrMapping/>
+  </p:clrMapOvr>
+</p:sld>
+</file>
+
+<file path=ppt/slides/slide12.xml><?xml version="1.0" encoding="utf-8"?>
+<p:sld xmlns:a="http://schemas.openxmlformats.org/drawingml/2006/main" xmlns:r="http://schemas.openxmlformats.org/officeDocument/2006/relationships" xmlns:p="http://schemas.openxmlformats.org/presentationml/2006/main">
+  <p:cSld>
+    <p:spTree>
+      <p:nvGrpSpPr>
+        <p:cNvPr id="1" name=""/>
+        <p:cNvGrpSpPr/>
+        <p:nvPr/>
+      </p:nvGrpSpPr>
+      <p:grpSpPr>
+        <a:xfrm>
+          <a:off x="0" y="0"/>
+          <a:ext cx="0" cy="0"/>
+          <a:chOff x="0" y="0"/>
+          <a:chExt cx="0" cy="0"/>
+        </a:xfrm>
+      </p:grpSpPr>
+      <p:sp>
+        <p:nvSpPr>
+          <p:cNvPr id="2" name="Title 1">
+            <a:extLst>
+              <a:ext uri="{FF2B5EF4-FFF2-40B4-BE49-F238E27FC236}">
+                <a16:creationId xmlns:a16="http://schemas.microsoft.com/office/drawing/2014/main" id="{2FC83E80-761E-7B45-A625-090ACFC0FAD8}"/>
+              </a:ext>
+            </a:extLst>
+          </p:cNvPr>
+          <p:cNvSpPr>
+            <a:spLocks noGrp="1"/>
+          </p:cNvSpPr>
+          <p:nvPr>
+            <p:ph type="title"/>
+          </p:nvPr>
+        </p:nvSpPr>
+        <p:spPr/>
+        <p:txBody>
+          <a:bodyPr/>
+          <a:lstStyle/>
+          <a:p>
+            <a:r>
+              <a:rPr lang="en-US" dirty="0"/>
+              <a:t>Penalty terms</a:t>
+            </a:r>
+          </a:p>
+        </p:txBody>
+      </p:sp>
+      <mc:AlternateContent xmlns:mc="http://schemas.openxmlformats.org/markup-compatibility/2006">
+        <mc:Choice xmlns:a14="http://schemas.microsoft.com/office/drawing/2010/main" Requires="a14">
+          <p:sp>
+            <p:nvSpPr>
+              <p:cNvPr id="3" name="Content Placeholder 2">
+                <a:extLst>
+                  <a:ext uri="{FF2B5EF4-FFF2-40B4-BE49-F238E27FC236}">
+                    <a16:creationId xmlns:a16="http://schemas.microsoft.com/office/drawing/2014/main" id="{0FD97800-EA8E-DF41-B214-EB17C839C782}"/>
+                  </a:ext>
+                </a:extLst>
+              </p:cNvPr>
+              <p:cNvSpPr>
+                <a:spLocks noGrp="1"/>
+              </p:cNvSpPr>
+              <p:nvPr>
+                <p:ph idx="1"/>
+              </p:nvPr>
+            </p:nvSpPr>
+            <p:spPr>
+              <a:xfrm>
+                <a:off x="1024128" y="1662545"/>
+                <a:ext cx="9720073" cy="4646815"/>
+              </a:xfrm>
+            </p:spPr>
+            <p:txBody>
+              <a:bodyPr/>
+              <a:lstStyle/>
+              <a:p>
+                <a:r>
+                  <a:rPr lang="en-US" dirty="0"/>
+                  <a:t>1) Nodes are divided into smaller groups of similar size</a:t>
+                </a:r>
+              </a:p>
+              <a:p>
+                <a:pPr algn="ctr"/>
+                <a14:m>
+                  <m:oMath xmlns:m="http://schemas.openxmlformats.org/officeDocument/2006/math">
+                    <m:sSub>
+                      <m:sSubPr>
+                        <m:ctrlPr>
+                          <a:rPr lang="en-US" b="0" i="1" smtClean="0">
+                            <a:latin typeface="Cambria Math" panose="02040503050406030204" pitchFamily="18" charset="0"/>
+                          </a:rPr>
+                        </m:ctrlPr>
+                      </m:sSubPr>
+                      <m:e>
+                        <m:r>
+                          <a:rPr lang="en-US" b="0" i="1" smtClean="0">
+                            <a:latin typeface="Cambria Math" panose="02040503050406030204" pitchFamily="18" charset="0"/>
+                          </a:rPr>
+                          <m:t>𝐺</m:t>
+                        </m:r>
+                      </m:e>
+                      <m:sub>
+                        <m:r>
+                          <a:rPr lang="en-US" b="0" i="1" smtClean="0">
+                            <a:latin typeface="Cambria Math" panose="02040503050406030204" pitchFamily="18" charset="0"/>
+                          </a:rPr>
+                          <m:t>1</m:t>
+                        </m:r>
+                      </m:sub>
+                    </m:sSub>
+                    <m:d>
+                      <m:dPr>
+                        <m:ctrlPr>
+                          <a:rPr lang="en-US" b="0" i="1" smtClean="0">
+                            <a:latin typeface="Cambria Math" panose="02040503050406030204" pitchFamily="18" charset="0"/>
+                          </a:rPr>
+                        </m:ctrlPr>
+                      </m:dPr>
+                      <m:e>
+                        <m:d>
+                          <m:dPr>
+                            <m:begChr m:val="{"/>
+                            <m:endChr m:val="}"/>
+                            <m:ctrlPr>
+                              <a:rPr lang="en-US" b="0" i="1" smtClean="0">
+                                <a:latin typeface="Cambria Math" panose="02040503050406030204" pitchFamily="18" charset="0"/>
+                              </a:rPr>
+                            </m:ctrlPr>
+                          </m:dPr>
+                          <m:e>
+                            <m:r>
+                              <a:rPr lang="en-US" b="0" i="1" smtClean="0">
+                                <a:latin typeface="Cambria Math" panose="02040503050406030204" pitchFamily="18" charset="0"/>
+                              </a:rPr>
+                              <m:t>𝑔</m:t>
+                            </m:r>
+                          </m:e>
+                        </m:d>
+                      </m:e>
+                    </m:d>
+                    <m:r>
+                      <a:rPr lang="en-US" b="0" i="1" smtClean="0">
+                        <a:latin typeface="Cambria Math" panose="02040503050406030204" pitchFamily="18" charset="0"/>
+                      </a:rPr>
+                      <m:t>=</m:t>
+                    </m:r>
+                    <m:nary>
+                      <m:naryPr>
+                        <m:chr m:val="∑"/>
+                        <m:supHide m:val="on"/>
+                        <m:ctrlPr>
+                          <a:rPr lang="en-US" b="0" i="1" smtClean="0">
+                            <a:latin typeface="Cambria Math" panose="02040503050406030204" pitchFamily="18" charset="0"/>
+                          </a:rPr>
+                        </m:ctrlPr>
+                      </m:naryPr>
+                      <m:sub>
+                        <m:r>
+                          <a:rPr lang="en-US" b="0" i="1" smtClean="0">
+                            <a:latin typeface="Cambria Math" panose="02040503050406030204" pitchFamily="18" charset="0"/>
+                          </a:rPr>
+                          <m:t>𝑔</m:t>
+                        </m:r>
+                      </m:sub>
+                      <m:sup/>
+                      <m:e>
+                        <m:sSubSup>
+                          <m:sSubSupPr>
+                            <m:ctrlPr>
+                              <a:rPr lang="en-US" b="0" i="1" smtClean="0">
+                                <a:latin typeface="Cambria Math" panose="02040503050406030204" pitchFamily="18" charset="0"/>
+                              </a:rPr>
+                            </m:ctrlPr>
+                          </m:sSubSupPr>
+                          <m:e>
+                            <m:r>
+                              <a:rPr lang="en-US" b="0" i="1" smtClean="0">
+                                <a:latin typeface="Cambria Math" panose="02040503050406030204" pitchFamily="18" charset="0"/>
+                              </a:rPr>
+                              <m:t>𝑛</m:t>
+                            </m:r>
+                          </m:e>
+                          <m:sub>
+                            <m:r>
+                              <a:rPr lang="en-US" b="0" i="1" smtClean="0">
+                                <a:latin typeface="Cambria Math" panose="02040503050406030204" pitchFamily="18" charset="0"/>
+                              </a:rPr>
+                              <m:t>𝑔</m:t>
+                            </m:r>
+                          </m:sub>
+                          <m:sup>
+                            <m:r>
+                              <a:rPr lang="en-US" b="0" i="1" smtClean="0">
+                                <a:latin typeface="Cambria Math" panose="02040503050406030204" pitchFamily="18" charset="0"/>
+                              </a:rPr>
+                              <m:t>2</m:t>
+                            </m:r>
+                          </m:sup>
+                        </m:sSubSup>
+                      </m:e>
+                    </m:nary>
+                  </m:oMath>
+                </a14:m>
+                <a:endParaRPr lang="en-US" dirty="0"/>
+              </a:p>
+              <a:p>
+                <a:r>
+                  <a:rPr lang="en-US" dirty="0"/>
+                  <a:t>Where </a:t>
+                </a:r>
+                <a14:m>
+                  <m:oMath xmlns:m="http://schemas.openxmlformats.org/officeDocument/2006/math">
+                    <m:sSub>
+                      <m:sSubPr>
+                        <m:ctrlPr>
+                          <a:rPr lang="en-US" b="0" i="1" smtClean="0">
+                            <a:latin typeface="Cambria Math" panose="02040503050406030204" pitchFamily="18" charset="0"/>
+                          </a:rPr>
+                        </m:ctrlPr>
+                      </m:sSubPr>
+                      <m:e>
+                        <m:r>
+                          <a:rPr lang="en-US" b="0" i="1" smtClean="0">
+                            <a:latin typeface="Cambria Math" panose="02040503050406030204" pitchFamily="18" charset="0"/>
+                          </a:rPr>
+                          <m:t>𝑛</m:t>
+                        </m:r>
+                      </m:e>
+                      <m:sub>
+                        <m:r>
+                          <a:rPr lang="en-US" b="0" i="1" smtClean="0">
+                            <a:latin typeface="Cambria Math" panose="02040503050406030204" pitchFamily="18" charset="0"/>
+                          </a:rPr>
+                          <m:t>𝑔</m:t>
+                        </m:r>
+                      </m:sub>
+                    </m:sSub>
+                  </m:oMath>
+                </a14:m>
+                <a:r>
+                  <a:rPr lang="en-US" dirty="0"/>
+                  <a:t> is the number of nodes in group </a:t>
+                </a:r>
+                <a14:m>
+                  <m:oMath xmlns:m="http://schemas.openxmlformats.org/officeDocument/2006/math">
+                    <m:r>
+                      <a:rPr lang="en-US" b="0" i="1" smtClean="0">
+                        <a:latin typeface="Cambria Math" panose="02040503050406030204" pitchFamily="18" charset="0"/>
+                      </a:rPr>
+                      <m:t>𝑔</m:t>
+                    </m:r>
+                    <m:r>
+                      <a:rPr lang="en-US" b="0" i="1" smtClean="0">
+                        <a:latin typeface="Cambria Math" panose="02040503050406030204" pitchFamily="18" charset="0"/>
+                      </a:rPr>
+                      <m:t>. </m:t>
+                    </m:r>
+                  </m:oMath>
+                </a14:m>
+                <a:endParaRPr lang="en-US" dirty="0"/>
+              </a:p>
+              <a:p>
+                <a:r>
+                  <a:rPr lang="en-US" dirty="0"/>
+                  <a:t>2) Nodes divided into groups having same total degree</a:t>
+                </a:r>
+              </a:p>
+              <a:p>
+                <a:pPr algn="ctr"/>
+                <a14:m>
+                  <m:oMath xmlns:m="http://schemas.openxmlformats.org/officeDocument/2006/math">
+                    <m:sSub>
+                      <m:sSubPr>
+                        <m:ctrlPr>
+                          <a:rPr lang="en-US" b="0" i="1" smtClean="0">
+                            <a:latin typeface="Cambria Math" panose="02040503050406030204" pitchFamily="18" charset="0"/>
+                          </a:rPr>
+                        </m:ctrlPr>
+                      </m:sSubPr>
+                      <m:e>
+                        <m:r>
+                          <a:rPr lang="en-US" b="0" i="1" smtClean="0">
+                            <a:latin typeface="Cambria Math" panose="02040503050406030204" pitchFamily="18" charset="0"/>
+                          </a:rPr>
+                          <m:t>𝐺</m:t>
+                        </m:r>
+                      </m:e>
+                      <m:sub>
+                        <m:r>
+                          <a:rPr lang="en-US" b="0" i="1" smtClean="0">
+                            <a:latin typeface="Cambria Math" panose="02040503050406030204" pitchFamily="18" charset="0"/>
+                          </a:rPr>
+                          <m:t>2</m:t>
+                        </m:r>
+                      </m:sub>
+                    </m:sSub>
+                    <m:d>
+                      <m:dPr>
+                        <m:ctrlPr>
+                          <a:rPr lang="en-US" b="0" i="1" smtClean="0">
+                            <a:latin typeface="Cambria Math" panose="02040503050406030204" pitchFamily="18" charset="0"/>
+                          </a:rPr>
+                        </m:ctrlPr>
+                      </m:dPr>
+                      <m:e>
+                        <m:d>
+                          <m:dPr>
+                            <m:begChr m:val="{"/>
+                            <m:endChr m:val="}"/>
+                            <m:ctrlPr>
+                              <a:rPr lang="en-US" b="0" i="1" smtClean="0">
+                                <a:latin typeface="Cambria Math" panose="02040503050406030204" pitchFamily="18" charset="0"/>
+                              </a:rPr>
+                            </m:ctrlPr>
+                          </m:dPr>
+                          <m:e>
+                            <m:r>
+                              <a:rPr lang="en-US" b="0" i="1" smtClean="0">
+                                <a:latin typeface="Cambria Math" panose="02040503050406030204" pitchFamily="18" charset="0"/>
+                              </a:rPr>
+                              <m:t>𝑔</m:t>
+                            </m:r>
+                          </m:e>
+                        </m:d>
+                      </m:e>
+                    </m:d>
+                    <m:r>
+                      <a:rPr lang="en-US" b="0" i="1" smtClean="0">
+                        <a:latin typeface="Cambria Math" panose="02040503050406030204" pitchFamily="18" charset="0"/>
+                      </a:rPr>
+                      <m:t>=</m:t>
+                    </m:r>
+                    <m:nary>
+                      <m:naryPr>
+                        <m:chr m:val="∑"/>
+                        <m:supHide m:val="on"/>
+                        <m:ctrlPr>
+                          <a:rPr lang="en-US" b="0" i="1" smtClean="0">
+                            <a:latin typeface="Cambria Math" panose="02040503050406030204" pitchFamily="18" charset="0"/>
+                          </a:rPr>
+                        </m:ctrlPr>
+                      </m:naryPr>
+                      <m:sub>
+                        <m:r>
+                          <a:rPr lang="en-US" b="0" i="1" smtClean="0">
+                            <a:latin typeface="Cambria Math" panose="02040503050406030204" pitchFamily="18" charset="0"/>
+                          </a:rPr>
+                          <m:t>𝑔</m:t>
+                        </m:r>
+                      </m:sub>
+                      <m:sup/>
+                      <m:e>
+                        <m:sSubSup>
+                          <m:sSubSupPr>
+                            <m:ctrlPr>
+                              <a:rPr lang="en-US" b="0" i="1" smtClean="0">
+                                <a:latin typeface="Cambria Math" panose="02040503050406030204" pitchFamily="18" charset="0"/>
+                              </a:rPr>
+                            </m:ctrlPr>
+                          </m:sSubSupPr>
+                          <m:e>
+                            <m:r>
+                              <a:rPr lang="en-US" b="0" i="1" smtClean="0">
+                                <a:latin typeface="Cambria Math" panose="02040503050406030204" pitchFamily="18" charset="0"/>
+                              </a:rPr>
+                              <m:t>𝑘</m:t>
+                            </m:r>
+                          </m:e>
+                          <m:sub>
+                            <m:r>
+                              <a:rPr lang="en-US" b="0" i="1" smtClean="0">
+                                <a:latin typeface="Cambria Math" panose="02040503050406030204" pitchFamily="18" charset="0"/>
+                              </a:rPr>
+                              <m:t>𝑔</m:t>
+                            </m:r>
+                          </m:sub>
+                          <m:sup>
+                            <m:r>
+                              <a:rPr lang="en-US" b="0" i="1" smtClean="0">
+                                <a:latin typeface="Cambria Math" panose="02040503050406030204" pitchFamily="18" charset="0"/>
+                              </a:rPr>
+                              <m:t>2</m:t>
+                            </m:r>
+                          </m:sup>
+                        </m:sSubSup>
+                      </m:e>
+                    </m:nary>
+                  </m:oMath>
+                </a14:m>
+                <a:endParaRPr lang="en-US" dirty="0"/>
+              </a:p>
+              <a:p>
+                <a:r>
+                  <a:rPr lang="en-US" dirty="0"/>
+                  <a:t>This penalty term with </a:t>
+                </a:r>
+                <a14:m>
+                  <m:oMath xmlns:m="http://schemas.openxmlformats.org/officeDocument/2006/math">
+                    <m:r>
+                      <a:rPr lang="en-US" b="0" i="1" smtClean="0">
+                        <a:latin typeface="Cambria Math" panose="02040503050406030204" pitchFamily="18" charset="0"/>
+                      </a:rPr>
+                      <m:t>𝜆</m:t>
+                    </m:r>
+                    <m:r>
+                      <a:rPr lang="en-US" b="0" i="1" smtClean="0">
+                        <a:latin typeface="Cambria Math" panose="02040503050406030204" pitchFamily="18" charset="0"/>
+                      </a:rPr>
+                      <m:t>=</m:t>
+                    </m:r>
+                    <m:f>
+                      <m:fPr>
+                        <m:ctrlPr>
+                          <a:rPr lang="en-US" b="0" i="1" smtClean="0">
+                            <a:latin typeface="Cambria Math" panose="02040503050406030204" pitchFamily="18" charset="0"/>
+                          </a:rPr>
+                        </m:ctrlPr>
+                      </m:fPr>
+                      <m:num>
+                        <m:r>
+                          <a:rPr lang="en-US" b="0" i="1" smtClean="0">
+                            <a:latin typeface="Cambria Math" panose="02040503050406030204" pitchFamily="18" charset="0"/>
+                          </a:rPr>
+                          <m:t>1</m:t>
+                        </m:r>
+                      </m:num>
+                      <m:den>
+                        <m:r>
+                          <a:rPr lang="en-US" b="0" i="1" smtClean="0">
+                            <a:latin typeface="Cambria Math" panose="02040503050406030204" pitchFamily="18" charset="0"/>
+                          </a:rPr>
+                          <m:t>2</m:t>
+                        </m:r>
+                        <m:r>
+                          <a:rPr lang="en-US" b="0" i="1" smtClean="0">
+                            <a:latin typeface="Cambria Math" panose="02040503050406030204" pitchFamily="18" charset="0"/>
+                          </a:rPr>
+                          <m:t>𝑚</m:t>
+                        </m:r>
+                      </m:den>
+                    </m:f>
+                  </m:oMath>
+                </a14:m>
+                <a:r>
+                  <a:rPr lang="en-US" b="0" dirty="0"/>
+                  <a:t> results in the objective function</a:t>
+                </a:r>
+              </a:p>
+              <a:p>
+                <a:endParaRPr lang="en-US" dirty="0"/>
+              </a:p>
+              <a:p>
+                <a:endParaRPr lang="en-US" b="0" dirty="0"/>
+              </a:p>
+              <a:p>
+                <a:r>
+                  <a:rPr lang="en-US" b="0" dirty="0"/>
+                  <a:t>Which is equivalent to maximizing the modularity:</a:t>
+                </a:r>
+              </a:p>
+            </p:txBody>
+          </p:sp>
+        </mc:Choice>
+        <mc:Fallback>
+          <p:sp>
+            <p:nvSpPr>
+              <p:cNvPr id="3" name="Content Placeholder 2">
+                <a:extLst>
+                  <a:ext uri="{FF2B5EF4-FFF2-40B4-BE49-F238E27FC236}">
+                    <a16:creationId xmlns:a16="http://schemas.microsoft.com/office/drawing/2014/main" id="{0FD97800-EA8E-DF41-B214-EB17C839C782}"/>
+                  </a:ext>
+                </a:extLst>
+              </p:cNvPr>
+              <p:cNvSpPr>
+                <a:spLocks noGrp="1" noRot="1" noChangeAspect="1" noMove="1" noResize="1" noEditPoints="1" noAdjustHandles="1" noChangeArrowheads="1" noChangeShapeType="1" noTextEdit="1"/>
+              </p:cNvSpPr>
+              <p:nvPr>
+                <p:ph idx="1"/>
+              </p:nvPr>
+            </p:nvSpPr>
+            <p:spPr>
+              <a:xfrm>
+                <a:off x="1024128" y="1662545"/>
+                <a:ext cx="9720073" cy="4646815"/>
+              </a:xfrm>
+              <a:blipFill>
+                <a:blip r:embed="rId2"/>
+                <a:stretch>
+                  <a:fillRect l="-261" t="-1635"/>
+                </a:stretch>
+              </a:blipFill>
+            </p:spPr>
+            <p:txBody>
+              <a:bodyPr/>
+              <a:lstStyle/>
+              <a:p>
+                <a:r>
+                  <a:rPr lang="en-US">
+                    <a:noFill/>
+                  </a:rPr>
+                  <a:t> </a:t>
+                </a:r>
+              </a:p>
+            </p:txBody>
+          </p:sp>
+        </mc:Fallback>
+      </mc:AlternateContent>
+      <p:pic>
+        <p:nvPicPr>
+          <p:cNvPr id="5" name="Picture 4">
+            <a:extLst>
+              <a:ext uri="{FF2B5EF4-FFF2-40B4-BE49-F238E27FC236}">
+                <a16:creationId xmlns:a16="http://schemas.microsoft.com/office/drawing/2014/main" id="{DAE9909A-86B1-FA43-9041-534211CFA795}"/>
+              </a:ext>
+            </a:extLst>
+          </p:cNvPr>
+          <p:cNvPicPr>
+            <a:picLocks noChangeAspect="1"/>
+          </p:cNvPicPr>
+          <p:nvPr/>
+        </p:nvPicPr>
+        <p:blipFill>
+          <a:blip r:embed="rId3"/>
+          <a:stretch>
+            <a:fillRect/>
+          </a:stretch>
+        </p:blipFill>
+        <p:spPr>
+          <a:xfrm>
+            <a:off x="6816437" y="5555673"/>
+            <a:ext cx="4349311" cy="823413"/>
+          </a:xfrm>
+          <a:prstGeom prst="rect">
+            <a:avLst/>
+          </a:prstGeom>
+        </p:spPr>
+      </p:pic>
+      <p:pic>
+        <p:nvPicPr>
+          <p:cNvPr id="7" name="Picture 6">
+            <a:extLst>
+              <a:ext uri="{FF2B5EF4-FFF2-40B4-BE49-F238E27FC236}">
+                <a16:creationId xmlns:a16="http://schemas.microsoft.com/office/drawing/2014/main" id="{8401A08D-D1D1-C345-97EE-BA2953B690D3}"/>
+              </a:ext>
+            </a:extLst>
+          </p:cNvPr>
+          <p:cNvPicPr>
+            <a:picLocks noChangeAspect="1"/>
+          </p:cNvPicPr>
+          <p:nvPr/>
+        </p:nvPicPr>
+        <p:blipFill>
+          <a:blip r:embed="rId4"/>
+          <a:stretch>
+            <a:fillRect/>
+          </a:stretch>
+        </p:blipFill>
+        <p:spPr>
+          <a:xfrm>
+            <a:off x="2782535" y="4570652"/>
+            <a:ext cx="5303958" cy="985021"/>
+          </a:xfrm>
+          <a:prstGeom prst="rect">
+            <a:avLst/>
+          </a:prstGeom>
+        </p:spPr>
+      </p:pic>
+    </p:spTree>
+    <p:extLst>
+      <p:ext uri="{BB962C8B-B14F-4D97-AF65-F5344CB8AC3E}">
+        <p14:creationId xmlns:p14="http://schemas.microsoft.com/office/powerpoint/2010/main" val="3976477287"/>
+      </p:ext>
+    </p:extLst>
+  </p:cSld>
+  <p:clrMapOvr>
+    <a:masterClrMapping/>
+  </p:clrMapOvr>
+</p:sld>
+</file>
+
+<file path=ppt/slides/slide13.xml><?xml version="1.0" encoding="utf-8"?>
+<p:sld xmlns:a="http://schemas.openxmlformats.org/drawingml/2006/main" xmlns:r="http://schemas.openxmlformats.org/officeDocument/2006/relationships" xmlns:p="http://schemas.openxmlformats.org/presentationml/2006/main">
+  <p:cSld>
+    <p:spTree>
+      <p:nvGrpSpPr>
+        <p:cNvPr id="1" name=""/>
+        <p:cNvGrpSpPr/>
+        <p:nvPr/>
+      </p:nvGrpSpPr>
+      <p:grpSpPr>
+        <a:xfrm>
+          <a:off x="0" y="0"/>
+          <a:ext cx="0" cy="0"/>
+          <a:chOff x="0" y="0"/>
+          <a:chExt cx="0" cy="0"/>
+        </a:xfrm>
+      </p:grpSpPr>
+      <p:sp>
+        <p:nvSpPr>
+          <p:cNvPr id="2" name="Title 1">
+            <a:extLst>
+              <a:ext uri="{FF2B5EF4-FFF2-40B4-BE49-F238E27FC236}">
+                <a16:creationId xmlns:a16="http://schemas.microsoft.com/office/drawing/2014/main" id="{31D221B7-746F-A849-8F63-7F4DC1DA270F}"/>
+              </a:ext>
+            </a:extLst>
+          </p:cNvPr>
+          <p:cNvSpPr>
+            <a:spLocks noGrp="1"/>
+          </p:cNvSpPr>
+          <p:nvPr>
+            <p:ph type="title"/>
+          </p:nvPr>
+        </p:nvSpPr>
+        <p:spPr/>
+        <p:txBody>
+          <a:bodyPr/>
+          <a:lstStyle/>
+          <a:p>
+            <a:r>
+              <a:rPr lang="en-US" dirty="0"/>
+              <a:t>Label Propagation with Preferences</a:t>
+            </a:r>
+          </a:p>
+        </p:txBody>
+      </p:sp>
+      <mc:AlternateContent xmlns:mc="http://schemas.openxmlformats.org/markup-compatibility/2006">
+        <mc:Choice xmlns:a14="http://schemas.microsoft.com/office/drawing/2010/main" Requires="a14">
+          <p:sp>
+            <p:nvSpPr>
+              <p:cNvPr id="3" name="Content Placeholder 2">
+                <a:extLst>
+                  <a:ext uri="{FF2B5EF4-FFF2-40B4-BE49-F238E27FC236}">
+                    <a16:creationId xmlns:a16="http://schemas.microsoft.com/office/drawing/2014/main" id="{1F6F2A19-F2C2-2844-8F53-0B04A28BE78B}"/>
+                  </a:ext>
+                </a:extLst>
+              </p:cNvPr>
+              <p:cNvSpPr>
+                <a:spLocks noGrp="1"/>
+              </p:cNvSpPr>
+              <p:nvPr>
+                <p:ph idx="1"/>
+              </p:nvPr>
+            </p:nvSpPr>
+            <p:spPr/>
+            <p:txBody>
+              <a:bodyPr/>
+              <a:lstStyle/>
+              <a:p>
+                <a:r>
+                  <a:rPr lang="en-US" dirty="0"/>
+                  <a:t>The propagation “strength”, </a:t>
+                </a:r>
+                <a14:m>
+                  <m:oMath xmlns:m="http://schemas.openxmlformats.org/officeDocument/2006/math">
+                    <m:sSub>
+                      <m:sSubPr>
+                        <m:ctrlPr>
+                          <a:rPr lang="en-US" b="0" i="1" smtClean="0">
+                            <a:latin typeface="Cambria Math" panose="02040503050406030204" pitchFamily="18" charset="0"/>
+                          </a:rPr>
+                        </m:ctrlPr>
+                      </m:sSubPr>
+                      <m:e>
+                        <m:r>
+                          <a:rPr lang="en-US" b="0" i="1" smtClean="0">
+                            <a:latin typeface="Cambria Math" panose="02040503050406030204" pitchFamily="18" charset="0"/>
+                          </a:rPr>
+                          <m:t>𝑝</m:t>
+                        </m:r>
+                      </m:e>
+                      <m:sub>
+                        <m:r>
+                          <a:rPr lang="en-US" b="0" i="1" smtClean="0">
+                            <a:latin typeface="Cambria Math" panose="02040503050406030204" pitchFamily="18" charset="0"/>
+                          </a:rPr>
+                          <m:t>𝑖</m:t>
+                        </m:r>
+                      </m:sub>
+                    </m:sSub>
+                  </m:oMath>
+                </a14:m>
+                <a:r>
+                  <a:rPr lang="en-US" dirty="0"/>
+                  <a:t>, of individual nodes can be defined in the label propagation to improve performance of label propagation. The update rule will look like</a:t>
+                </a:r>
+              </a:p>
+              <a:p>
+                <a:pPr algn="ctr"/>
+                <a14:m>
+                  <m:oMath xmlns:m="http://schemas.openxmlformats.org/officeDocument/2006/math">
+                    <m:sSub>
+                      <m:sSubPr>
+                        <m:ctrlPr>
+                          <a:rPr lang="en-US" b="0" i="1" smtClean="0">
+                            <a:latin typeface="Cambria Math" panose="02040503050406030204" pitchFamily="18" charset="0"/>
+                          </a:rPr>
+                        </m:ctrlPr>
+                      </m:sSubPr>
+                      <m:e>
+                        <m:r>
+                          <a:rPr lang="en-US" b="0" i="1" smtClean="0">
+                            <a:latin typeface="Cambria Math" panose="02040503050406030204" pitchFamily="18" charset="0"/>
+                          </a:rPr>
+                          <m:t>𝑔</m:t>
+                        </m:r>
+                      </m:e>
+                      <m:sub>
+                        <m:r>
+                          <a:rPr lang="en-US" b="0" i="1" smtClean="0">
+                            <a:latin typeface="Cambria Math" panose="02040503050406030204" pitchFamily="18" charset="0"/>
+                          </a:rPr>
+                          <m:t>𝑖</m:t>
+                        </m:r>
+                      </m:sub>
+                    </m:sSub>
+                    <m:r>
+                      <a:rPr lang="en-US" b="0" i="1" smtClean="0">
+                        <a:latin typeface="Cambria Math" panose="02040503050406030204" pitchFamily="18" charset="0"/>
+                      </a:rPr>
+                      <m:t>=</m:t>
+                    </m:r>
+                    <m:r>
+                      <a:rPr lang="en-US" b="0" i="1" smtClean="0">
+                        <a:latin typeface="Cambria Math" panose="02040503050406030204" pitchFamily="18" charset="0"/>
+                      </a:rPr>
+                      <m:t>𝑎𝑟𝑔𝑚𝑎</m:t>
+                    </m:r>
+                    <m:sSub>
+                      <m:sSubPr>
+                        <m:ctrlPr>
+                          <a:rPr lang="en-US" b="0" i="1" smtClean="0">
+                            <a:latin typeface="Cambria Math" panose="02040503050406030204" pitchFamily="18" charset="0"/>
+                          </a:rPr>
+                        </m:ctrlPr>
+                      </m:sSubPr>
+                      <m:e>
+                        <m:r>
+                          <a:rPr lang="en-US" b="0" i="1" smtClean="0">
+                            <a:latin typeface="Cambria Math" panose="02040503050406030204" pitchFamily="18" charset="0"/>
+                          </a:rPr>
+                          <m:t>𝑥</m:t>
+                        </m:r>
+                      </m:e>
+                      <m:sub>
+                        <m:r>
+                          <a:rPr lang="en-US" b="0" i="1" smtClean="0">
+                            <a:latin typeface="Cambria Math" panose="02040503050406030204" pitchFamily="18" charset="0"/>
+                          </a:rPr>
+                          <m:t>𝑔</m:t>
+                        </m:r>
+                      </m:sub>
+                    </m:sSub>
+                    <m:nary>
+                      <m:naryPr>
+                        <m:chr m:val="∑"/>
+                        <m:supHide m:val="on"/>
+                        <m:ctrlPr>
+                          <a:rPr lang="en-US" b="0" i="1" smtClean="0">
+                            <a:latin typeface="Cambria Math" panose="02040503050406030204" pitchFamily="18" charset="0"/>
+                          </a:rPr>
+                        </m:ctrlPr>
+                      </m:naryPr>
+                      <m:sub>
+                        <m:r>
+                          <a:rPr lang="en-US" b="0" i="1" smtClean="0">
+                            <a:latin typeface="Cambria Math" panose="02040503050406030204" pitchFamily="18" charset="0"/>
+                          </a:rPr>
+                          <m:t>𝑗</m:t>
+                        </m:r>
+                      </m:sub>
+                      <m:sup/>
+                      <m:e>
+                        <m:sSub>
+                          <m:sSubPr>
+                            <m:ctrlPr>
+                              <a:rPr lang="en-US" b="0" i="1" smtClean="0">
+                                <a:latin typeface="Cambria Math" panose="02040503050406030204" pitchFamily="18" charset="0"/>
+                              </a:rPr>
+                            </m:ctrlPr>
+                          </m:sSubPr>
+                          <m:e>
+                            <m:r>
+                              <a:rPr lang="en-US" b="0" i="1" smtClean="0">
+                                <a:latin typeface="Cambria Math" panose="02040503050406030204" pitchFamily="18" charset="0"/>
+                              </a:rPr>
+                              <m:t>𝑝</m:t>
+                            </m:r>
+                          </m:e>
+                          <m:sub>
+                            <m:r>
+                              <a:rPr lang="en-US" b="0" i="1" smtClean="0">
+                                <a:latin typeface="Cambria Math" panose="02040503050406030204" pitchFamily="18" charset="0"/>
+                              </a:rPr>
+                              <m:t>𝑗</m:t>
+                            </m:r>
+                          </m:sub>
+                        </m:sSub>
+                        <m:sSub>
+                          <m:sSubPr>
+                            <m:ctrlPr>
+                              <a:rPr lang="en-US" b="0" i="1" smtClean="0">
+                                <a:latin typeface="Cambria Math" panose="02040503050406030204" pitchFamily="18" charset="0"/>
+                              </a:rPr>
+                            </m:ctrlPr>
+                          </m:sSubPr>
+                          <m:e>
+                            <m:r>
+                              <a:rPr lang="en-US" b="0" i="1" smtClean="0">
+                                <a:latin typeface="Cambria Math" panose="02040503050406030204" pitchFamily="18" charset="0"/>
+                              </a:rPr>
+                              <m:t>𝐴</m:t>
+                            </m:r>
+                          </m:e>
+                          <m:sub>
+                            <m:d>
+                              <m:dPr>
+                                <m:begChr m:val="{"/>
+                                <m:endChr m:val="}"/>
+                                <m:ctrlPr>
+                                  <a:rPr lang="en-US" b="0" i="1" smtClean="0">
+                                    <a:latin typeface="Cambria Math" panose="02040503050406030204" pitchFamily="18" charset="0"/>
+                                  </a:rPr>
+                                </m:ctrlPr>
+                              </m:dPr>
+                              <m:e>
+                                <m:r>
+                                  <a:rPr lang="en-US" b="0" i="1" smtClean="0">
+                                    <a:latin typeface="Cambria Math" panose="02040503050406030204" pitchFamily="18" charset="0"/>
+                                  </a:rPr>
+                                  <m:t>𝑖</m:t>
+                                </m:r>
+                                <m:r>
+                                  <a:rPr lang="en-US" b="0" i="1" smtClean="0">
+                                    <a:latin typeface="Cambria Math" panose="02040503050406030204" pitchFamily="18" charset="0"/>
+                                  </a:rPr>
+                                  <m:t>,</m:t>
+                                </m:r>
+                                <m:r>
+                                  <a:rPr lang="en-US" b="0" i="1" smtClean="0">
+                                    <a:latin typeface="Cambria Math" panose="02040503050406030204" pitchFamily="18" charset="0"/>
+                                  </a:rPr>
+                                  <m:t>𝑗</m:t>
+                                </m:r>
+                              </m:e>
+                            </m:d>
+                          </m:sub>
+                        </m:sSub>
+                        <m:r>
+                          <a:rPr lang="en-US" b="0" i="1" smtClean="0">
+                            <a:latin typeface="Cambria Math" panose="02040503050406030204" pitchFamily="18" charset="0"/>
+                          </a:rPr>
+                          <m:t>𝛿</m:t>
+                        </m:r>
+                        <m:r>
+                          <a:rPr lang="en-US" b="0" i="1" smtClean="0">
+                            <a:latin typeface="Cambria Math" panose="02040503050406030204" pitchFamily="18" charset="0"/>
+                          </a:rPr>
+                          <m:t>(</m:t>
+                        </m:r>
+                        <m:sSub>
+                          <m:sSubPr>
+                            <m:ctrlPr>
+                              <a:rPr lang="en-US" b="0" i="1" smtClean="0">
+                                <a:latin typeface="Cambria Math" panose="02040503050406030204" pitchFamily="18" charset="0"/>
+                              </a:rPr>
+                            </m:ctrlPr>
+                          </m:sSubPr>
+                          <m:e>
+                            <m:r>
+                              <a:rPr lang="en-US" b="0" i="1" smtClean="0">
+                                <a:latin typeface="Cambria Math" panose="02040503050406030204" pitchFamily="18" charset="0"/>
+                              </a:rPr>
+                              <m:t>𝑔</m:t>
+                            </m:r>
+                          </m:e>
+                          <m:sub>
+                            <m:r>
+                              <a:rPr lang="en-US" b="0" i="1" smtClean="0">
+                                <a:latin typeface="Cambria Math" panose="02040503050406030204" pitchFamily="18" charset="0"/>
+                              </a:rPr>
+                              <m:t>𝑖</m:t>
+                            </m:r>
+                          </m:sub>
+                        </m:sSub>
+                        <m:r>
+                          <a:rPr lang="en-US" b="0" i="1" smtClean="0">
+                            <a:latin typeface="Cambria Math" panose="02040503050406030204" pitchFamily="18" charset="0"/>
+                          </a:rPr>
+                          <m:t>, </m:t>
+                        </m:r>
+                        <m:sSub>
+                          <m:sSubPr>
+                            <m:ctrlPr>
+                              <a:rPr lang="en-US" b="0" i="1" smtClean="0">
+                                <a:latin typeface="Cambria Math" panose="02040503050406030204" pitchFamily="18" charset="0"/>
+                              </a:rPr>
+                            </m:ctrlPr>
+                          </m:sSubPr>
+                          <m:e>
+                            <m:r>
+                              <a:rPr lang="en-US" b="0" i="1" smtClean="0">
+                                <a:latin typeface="Cambria Math" panose="02040503050406030204" pitchFamily="18" charset="0"/>
+                              </a:rPr>
+                              <m:t>𝑔</m:t>
+                            </m:r>
+                          </m:e>
+                          <m:sub>
+                            <m:r>
+                              <a:rPr lang="en-US" b="0" i="1" smtClean="0">
+                                <a:latin typeface="Cambria Math" panose="02040503050406030204" pitchFamily="18" charset="0"/>
+                              </a:rPr>
+                              <m:t>𝑗</m:t>
+                            </m:r>
+                          </m:sub>
+                        </m:sSub>
+                        <m:r>
+                          <a:rPr lang="en-US" b="0" i="1" smtClean="0">
+                            <a:latin typeface="Cambria Math" panose="02040503050406030204" pitchFamily="18" charset="0"/>
+                          </a:rPr>
+                          <m:t>)</m:t>
+                        </m:r>
+                      </m:e>
+                    </m:nary>
+                  </m:oMath>
+                </a14:m>
+                <a:endParaRPr lang="en-US" dirty="0"/>
+              </a:p>
+              <a:p>
+                <a:r>
+                  <a:rPr lang="en-US" dirty="0"/>
+                  <a:t>and the objective function becomes</a:t>
+                </a:r>
+              </a:p>
+              <a:p>
+                <a:pPr algn="ctr"/>
+                <a14:m>
+                  <m:oMath xmlns:m="http://schemas.openxmlformats.org/officeDocument/2006/math">
+                    <m:sSub>
+                      <m:sSubPr>
+                        <m:ctrlPr>
+                          <a:rPr lang="en-US" b="0" i="1" smtClean="0">
+                            <a:latin typeface="Cambria Math" panose="02040503050406030204" pitchFamily="18" charset="0"/>
+                          </a:rPr>
+                        </m:ctrlPr>
+                      </m:sSubPr>
+                      <m:e>
+                        <m:r>
+                          <a:rPr lang="en-US" b="0" i="1" smtClean="0">
+                            <a:latin typeface="Cambria Math" panose="02040503050406030204" pitchFamily="18" charset="0"/>
+                          </a:rPr>
+                          <m:t>𝐻</m:t>
+                        </m:r>
+                      </m:e>
+                      <m:sub>
+                        <m:r>
+                          <a:rPr lang="en-US" b="0" i="1" smtClean="0">
+                            <a:latin typeface="Cambria Math" panose="02040503050406030204" pitchFamily="18" charset="0"/>
+                          </a:rPr>
+                          <m:t>𝑝</m:t>
+                        </m:r>
+                      </m:sub>
+                    </m:sSub>
+                    <m:d>
+                      <m:dPr>
+                        <m:ctrlPr>
+                          <a:rPr lang="en-US" b="0" i="1" smtClean="0">
+                            <a:latin typeface="Cambria Math" panose="02040503050406030204" pitchFamily="18" charset="0"/>
+                          </a:rPr>
+                        </m:ctrlPr>
+                      </m:dPr>
+                      <m:e>
+                        <m:d>
+                          <m:dPr>
+                            <m:begChr m:val="{"/>
+                            <m:endChr m:val="}"/>
+                            <m:ctrlPr>
+                              <a:rPr lang="en-US" b="0" i="1" smtClean="0">
+                                <a:latin typeface="Cambria Math" panose="02040503050406030204" pitchFamily="18" charset="0"/>
+                              </a:rPr>
+                            </m:ctrlPr>
+                          </m:dPr>
+                          <m:e>
+                            <m:r>
+                              <a:rPr lang="en-US" b="0" i="1" smtClean="0">
+                                <a:latin typeface="Cambria Math" panose="02040503050406030204" pitchFamily="18" charset="0"/>
+                              </a:rPr>
+                              <m:t>𝑔</m:t>
+                            </m:r>
+                          </m:e>
+                        </m:d>
+                      </m:e>
+                    </m:d>
+                    <m:r>
+                      <a:rPr lang="en-US" b="0" i="1" smtClean="0">
+                        <a:latin typeface="Cambria Math" panose="02040503050406030204" pitchFamily="18" charset="0"/>
+                      </a:rPr>
+                      <m:t>=−</m:t>
+                    </m:r>
+                    <m:nary>
+                      <m:naryPr>
+                        <m:chr m:val="∑"/>
+                        <m:supHide m:val="on"/>
+                        <m:ctrlPr>
+                          <a:rPr lang="en-US" b="0" i="1" smtClean="0">
+                            <a:latin typeface="Cambria Math" panose="02040503050406030204" pitchFamily="18" charset="0"/>
+                          </a:rPr>
+                        </m:ctrlPr>
+                      </m:naryPr>
+                      <m:sub>
+                        <m:d>
+                          <m:dPr>
+                            <m:begChr m:val="{"/>
+                            <m:endChr m:val="}"/>
+                            <m:ctrlPr>
+                              <a:rPr lang="en-US" b="0" i="1" smtClean="0">
+                                <a:latin typeface="Cambria Math" panose="02040503050406030204" pitchFamily="18" charset="0"/>
+                              </a:rPr>
+                            </m:ctrlPr>
+                          </m:dPr>
+                          <m:e>
+                            <m:r>
+                              <a:rPr lang="en-US" b="0" i="1" smtClean="0">
+                                <a:latin typeface="Cambria Math" panose="02040503050406030204" pitchFamily="18" charset="0"/>
+                              </a:rPr>
+                              <m:t>𝑖</m:t>
+                            </m:r>
+                            <m:r>
+                              <a:rPr lang="en-US" b="0" i="1" smtClean="0">
+                                <a:latin typeface="Cambria Math" panose="02040503050406030204" pitchFamily="18" charset="0"/>
+                              </a:rPr>
+                              <m:t>,</m:t>
+                            </m:r>
+                            <m:r>
+                              <a:rPr lang="en-US" b="0" i="1" smtClean="0">
+                                <a:latin typeface="Cambria Math" panose="02040503050406030204" pitchFamily="18" charset="0"/>
+                              </a:rPr>
+                              <m:t>𝑗</m:t>
+                            </m:r>
+                          </m:e>
+                        </m:d>
+                      </m:sub>
+                      <m:sup/>
+                      <m:e>
+                        <m:sSub>
+                          <m:sSubPr>
+                            <m:ctrlPr>
+                              <a:rPr lang="en-US" b="0" i="1" smtClean="0">
+                                <a:latin typeface="Cambria Math" panose="02040503050406030204" pitchFamily="18" charset="0"/>
+                              </a:rPr>
+                            </m:ctrlPr>
+                          </m:sSubPr>
+                          <m:e>
+                            <m:r>
+                              <a:rPr lang="en-US" b="0" i="1" smtClean="0">
+                                <a:latin typeface="Cambria Math" panose="02040503050406030204" pitchFamily="18" charset="0"/>
+                              </a:rPr>
+                              <m:t>𝑝</m:t>
+                            </m:r>
+                          </m:e>
+                          <m:sub>
+                            <m:r>
+                              <a:rPr lang="en-US" b="0" i="1" smtClean="0">
+                                <a:latin typeface="Cambria Math" panose="02040503050406030204" pitchFamily="18" charset="0"/>
+                              </a:rPr>
+                              <m:t>𝑖</m:t>
+                            </m:r>
+                          </m:sub>
+                        </m:sSub>
+                        <m:sSub>
+                          <m:sSubPr>
+                            <m:ctrlPr>
+                              <a:rPr lang="en-US" b="0" i="1" smtClean="0">
+                                <a:latin typeface="Cambria Math" panose="02040503050406030204" pitchFamily="18" charset="0"/>
+                              </a:rPr>
+                            </m:ctrlPr>
+                          </m:sSubPr>
+                          <m:e>
+                            <m:r>
+                              <a:rPr lang="en-US" b="0" i="1" smtClean="0">
+                                <a:latin typeface="Cambria Math" panose="02040503050406030204" pitchFamily="18" charset="0"/>
+                              </a:rPr>
+                              <m:t>𝑝</m:t>
+                            </m:r>
+                          </m:e>
+                          <m:sub>
+                            <m:r>
+                              <a:rPr lang="en-US" b="0" i="1" smtClean="0">
+                                <a:latin typeface="Cambria Math" panose="02040503050406030204" pitchFamily="18" charset="0"/>
+                              </a:rPr>
+                              <m:t>𝑗</m:t>
+                            </m:r>
+                          </m:sub>
+                        </m:sSub>
+                        <m:sSub>
+                          <m:sSubPr>
+                            <m:ctrlPr>
+                              <a:rPr lang="en-US" b="0" i="1" smtClean="0">
+                                <a:latin typeface="Cambria Math" panose="02040503050406030204" pitchFamily="18" charset="0"/>
+                              </a:rPr>
+                            </m:ctrlPr>
+                          </m:sSubPr>
+                          <m:e>
+                            <m:r>
+                              <a:rPr lang="en-US" b="0" i="1" smtClean="0">
+                                <a:latin typeface="Cambria Math" panose="02040503050406030204" pitchFamily="18" charset="0"/>
+                              </a:rPr>
+                              <m:t>𝐴</m:t>
+                            </m:r>
+                          </m:e>
+                          <m:sub>
+                            <m:d>
+                              <m:dPr>
+                                <m:begChr m:val="{"/>
+                                <m:endChr m:val="}"/>
+                                <m:ctrlPr>
+                                  <a:rPr lang="en-US" b="0" i="1" smtClean="0">
+                                    <a:latin typeface="Cambria Math" panose="02040503050406030204" pitchFamily="18" charset="0"/>
+                                  </a:rPr>
+                                </m:ctrlPr>
+                              </m:dPr>
+                              <m:e>
+                                <m:r>
+                                  <a:rPr lang="en-US" b="0" i="1" smtClean="0">
+                                    <a:latin typeface="Cambria Math" panose="02040503050406030204" pitchFamily="18" charset="0"/>
+                                  </a:rPr>
+                                  <m:t>𝑖</m:t>
+                                </m:r>
+                                <m:r>
+                                  <a:rPr lang="en-US" b="0" i="1" smtClean="0">
+                                    <a:latin typeface="Cambria Math" panose="02040503050406030204" pitchFamily="18" charset="0"/>
+                                  </a:rPr>
+                                  <m:t>,</m:t>
+                                </m:r>
+                                <m:r>
+                                  <a:rPr lang="en-US" b="0" i="1" smtClean="0">
+                                    <a:latin typeface="Cambria Math" panose="02040503050406030204" pitchFamily="18" charset="0"/>
+                                  </a:rPr>
+                                  <m:t>𝑗</m:t>
+                                </m:r>
+                              </m:e>
+                            </m:d>
+                          </m:sub>
+                        </m:sSub>
+                        <m:r>
+                          <a:rPr lang="en-US" b="0" i="1" smtClean="0">
+                            <a:latin typeface="Cambria Math" panose="02040503050406030204" pitchFamily="18" charset="0"/>
+                          </a:rPr>
+                          <m:t>𝛿</m:t>
+                        </m:r>
+                        <m:d>
+                          <m:dPr>
+                            <m:ctrlPr>
+                              <a:rPr lang="en-US" b="0" i="1" smtClean="0">
+                                <a:latin typeface="Cambria Math" panose="02040503050406030204" pitchFamily="18" charset="0"/>
+                              </a:rPr>
+                            </m:ctrlPr>
+                          </m:dPr>
+                          <m:e>
+                            <m:sSub>
+                              <m:sSubPr>
+                                <m:ctrlPr>
+                                  <a:rPr lang="en-US" b="0" i="1" smtClean="0">
+                                    <a:latin typeface="Cambria Math" panose="02040503050406030204" pitchFamily="18" charset="0"/>
+                                  </a:rPr>
+                                </m:ctrlPr>
+                              </m:sSubPr>
+                              <m:e>
+                                <m:r>
+                                  <a:rPr lang="en-US" b="0" i="1" smtClean="0">
+                                    <a:latin typeface="Cambria Math" panose="02040503050406030204" pitchFamily="18" charset="0"/>
+                                  </a:rPr>
+                                  <m:t>𝑔</m:t>
+                                </m:r>
+                              </m:e>
+                              <m:sub>
+                                <m:r>
+                                  <a:rPr lang="en-US" b="0" i="1" smtClean="0">
+                                    <a:latin typeface="Cambria Math" panose="02040503050406030204" pitchFamily="18" charset="0"/>
+                                  </a:rPr>
+                                  <m:t>𝑖</m:t>
+                                </m:r>
+                              </m:sub>
+                            </m:sSub>
+                            <m:r>
+                              <a:rPr lang="en-US" b="0" i="1" smtClean="0">
+                                <a:latin typeface="Cambria Math" panose="02040503050406030204" pitchFamily="18" charset="0"/>
+                              </a:rPr>
+                              <m:t>, </m:t>
+                            </m:r>
+                            <m:sSub>
+                              <m:sSubPr>
+                                <m:ctrlPr>
+                                  <a:rPr lang="en-US" b="0" i="1" smtClean="0">
+                                    <a:latin typeface="Cambria Math" panose="02040503050406030204" pitchFamily="18" charset="0"/>
+                                  </a:rPr>
+                                </m:ctrlPr>
+                              </m:sSubPr>
+                              <m:e>
+                                <m:r>
+                                  <a:rPr lang="en-US" b="0" i="1" smtClean="0">
+                                    <a:latin typeface="Cambria Math" panose="02040503050406030204" pitchFamily="18" charset="0"/>
+                                  </a:rPr>
+                                  <m:t>𝑔</m:t>
+                                </m:r>
+                              </m:e>
+                              <m:sub>
+                                <m:r>
+                                  <a:rPr lang="en-US" b="0" i="1" smtClean="0">
+                                    <a:latin typeface="Cambria Math" panose="02040503050406030204" pitchFamily="18" charset="0"/>
+                                  </a:rPr>
+                                  <m:t>𝑗</m:t>
+                                </m:r>
+                              </m:sub>
+                            </m:sSub>
+                          </m:e>
+                        </m:d>
+                      </m:e>
+                    </m:nary>
+                  </m:oMath>
+                </a14:m>
+                <a:endParaRPr lang="en-US" dirty="0"/>
+              </a:p>
+              <a:p>
+                <a:r>
+                  <a:rPr lang="en-US" dirty="0"/>
+                  <a:t>Example preference definition is </a:t>
+                </a:r>
+                <a14:m>
+                  <m:oMath xmlns:m="http://schemas.openxmlformats.org/officeDocument/2006/math">
+                    <m:sSub>
+                      <m:sSubPr>
+                        <m:ctrlPr>
+                          <a:rPr lang="en-US" b="0" i="1" smtClean="0">
+                            <a:latin typeface="Cambria Math" panose="02040503050406030204" pitchFamily="18" charset="0"/>
+                          </a:rPr>
+                        </m:ctrlPr>
+                      </m:sSubPr>
+                      <m:e>
+                        <m:r>
+                          <a:rPr lang="en-US" b="0" i="1" smtClean="0">
+                            <a:latin typeface="Cambria Math" panose="02040503050406030204" pitchFamily="18" charset="0"/>
+                          </a:rPr>
+                          <m:t>𝑝</m:t>
+                        </m:r>
+                      </m:e>
+                      <m:sub>
+                        <m:r>
+                          <a:rPr lang="en-US" b="0" i="1" smtClean="0">
+                            <a:latin typeface="Cambria Math" panose="02040503050406030204" pitchFamily="18" charset="0"/>
+                          </a:rPr>
+                          <m:t>𝑖</m:t>
+                        </m:r>
+                      </m:sub>
+                    </m:sSub>
+                    <m:r>
+                      <a:rPr lang="en-US" b="0" i="1" smtClean="0">
+                        <a:latin typeface="Cambria Math" panose="02040503050406030204" pitchFamily="18" charset="0"/>
+                      </a:rPr>
+                      <m:t>=</m:t>
+                    </m:r>
+                    <m:sSub>
+                      <m:sSubPr>
+                        <m:ctrlPr>
+                          <a:rPr lang="en-US" b="0" i="1" smtClean="0">
+                            <a:latin typeface="Cambria Math" panose="02040503050406030204" pitchFamily="18" charset="0"/>
+                          </a:rPr>
+                        </m:ctrlPr>
+                      </m:sSubPr>
+                      <m:e>
+                        <m:r>
+                          <a:rPr lang="en-US" b="0" i="1" smtClean="0">
+                            <a:latin typeface="Cambria Math" panose="02040503050406030204" pitchFamily="18" charset="0"/>
+                          </a:rPr>
+                          <m:t>𝑘</m:t>
+                        </m:r>
+                      </m:e>
+                      <m:sub>
+                        <m:r>
+                          <a:rPr lang="en-US" b="0" i="1" smtClean="0">
+                            <a:latin typeface="Cambria Math" panose="02040503050406030204" pitchFamily="18" charset="0"/>
+                          </a:rPr>
+                          <m:t>𝑖</m:t>
+                        </m:r>
+                      </m:sub>
+                    </m:sSub>
+                  </m:oMath>
+                </a14:m>
+                <a:endParaRPr lang="en-US" dirty="0"/>
+              </a:p>
+            </p:txBody>
+          </p:sp>
+        </mc:Choice>
+        <mc:Fallback>
+          <p:sp>
+            <p:nvSpPr>
+              <p:cNvPr id="3" name="Content Placeholder 2">
+                <a:extLst>
+                  <a:ext uri="{FF2B5EF4-FFF2-40B4-BE49-F238E27FC236}">
+                    <a16:creationId xmlns:a16="http://schemas.microsoft.com/office/drawing/2014/main" id="{1F6F2A19-F2C2-2844-8F53-0B04A28BE78B}"/>
+                  </a:ext>
+                </a:extLst>
+              </p:cNvPr>
+              <p:cNvSpPr>
+                <a:spLocks noGrp="1" noRot="1" noChangeAspect="1" noMove="1" noResize="1" noEditPoints="1" noAdjustHandles="1" noChangeArrowheads="1" noChangeShapeType="1" noTextEdit="1"/>
+              </p:cNvSpPr>
+              <p:nvPr>
+                <p:ph idx="1"/>
+              </p:nvPr>
+            </p:nvSpPr>
+            <p:spPr>
+              <a:blipFill>
+                <a:blip r:embed="rId2"/>
+                <a:stretch>
+                  <a:fillRect l="-261" t="-2208" r="-1436"/>
+                </a:stretch>
+              </a:blipFill>
+            </p:spPr>
+            <p:txBody>
+              <a:bodyPr/>
+              <a:lstStyle/>
+              <a:p>
+                <a:r>
+                  <a:rPr lang="en-US">
+                    <a:noFill/>
+                  </a:rPr>
+                  <a:t> </a:t>
+                </a:r>
+              </a:p>
+            </p:txBody>
+          </p:sp>
+        </mc:Fallback>
+      </mc:AlternateContent>
+    </p:spTree>
+    <p:extLst>
+      <p:ext uri="{BB962C8B-B14F-4D97-AF65-F5344CB8AC3E}">
+        <p14:creationId xmlns:p14="http://schemas.microsoft.com/office/powerpoint/2010/main" val="4233704683"/>
+      </p:ext>
+    </p:extLst>
+  </p:cSld>
+  <p:clrMapOvr>
+    <a:masterClrMapping/>
+  </p:clrMapOvr>
+</p:sld>
+</file>
+
+<file path=ppt/slides/slide14.xml><?xml version="1.0" encoding="utf-8"?>
+<p:sld xmlns:a="http://schemas.openxmlformats.org/drawingml/2006/main" xmlns:r="http://schemas.openxmlformats.org/officeDocument/2006/relationships" xmlns:p="http://schemas.openxmlformats.org/presentationml/2006/main">
+  <p:cSld>
+    <p:spTree>
+      <p:nvGrpSpPr>
+        <p:cNvPr id="1" name=""/>
+        <p:cNvGrpSpPr/>
+        <p:nvPr/>
+      </p:nvGrpSpPr>
+      <p:grpSpPr>
+        <a:xfrm>
+          <a:off x="0" y="0"/>
+          <a:ext cx="0" cy="0"/>
+          <a:chOff x="0" y="0"/>
+          <a:chExt cx="0" cy="0"/>
+        </a:xfrm>
+      </p:grpSpPr>
+      <p:sp>
+        <p:nvSpPr>
+          <p:cNvPr id="2" name="Title 1">
+            <a:extLst>
+              <a:ext uri="{FF2B5EF4-FFF2-40B4-BE49-F238E27FC236}">
+                <a16:creationId xmlns:a16="http://schemas.microsoft.com/office/drawing/2014/main" id="{31564A55-0095-4847-9501-20ECA5FDC674}"/>
+              </a:ext>
+            </a:extLst>
+          </p:cNvPr>
+          <p:cNvSpPr>
+            <a:spLocks noGrp="1"/>
+          </p:cNvSpPr>
+          <p:nvPr>
+            <p:ph type="title"/>
+          </p:nvPr>
+        </p:nvSpPr>
+        <p:spPr/>
+        <p:txBody>
+          <a:bodyPr/>
+          <a:lstStyle/>
+          <a:p>
+            <a:r>
+              <a:rPr lang="en-US" dirty="0"/>
+              <a:t>Defensive Propagation</a:t>
+            </a:r>
+          </a:p>
+        </p:txBody>
+      </p:sp>
+      <mc:AlternateContent xmlns:mc="http://schemas.openxmlformats.org/markup-compatibility/2006">
+        <mc:Choice xmlns:a14="http://schemas.microsoft.com/office/drawing/2010/main" Requires="a14">
+          <p:sp>
+            <p:nvSpPr>
+              <p:cNvPr id="3" name="Content Placeholder 2">
+                <a:extLst>
+                  <a:ext uri="{FF2B5EF4-FFF2-40B4-BE49-F238E27FC236}">
+                    <a16:creationId xmlns:a16="http://schemas.microsoft.com/office/drawing/2014/main" id="{7DEBA29A-54E0-5B48-BB27-DB28A2D1A03C}"/>
+                  </a:ext>
+                </a:extLst>
+              </p:cNvPr>
+              <p:cNvSpPr>
+                <a:spLocks noGrp="1"/>
+              </p:cNvSpPr>
+              <p:nvPr>
+                <p:ph idx="1"/>
+              </p:nvPr>
+            </p:nvSpPr>
+            <p:spPr/>
+            <p:txBody>
+              <a:bodyPr/>
+              <a:lstStyle/>
+              <a:p>
+                <a:r>
+                  <a:rPr lang="en-US" dirty="0"/>
+                  <a:t>Initialize </a:t>
+                </a:r>
+                <a14:m>
+                  <m:oMath xmlns:m="http://schemas.openxmlformats.org/officeDocument/2006/math">
+                    <m:sSub>
+                      <m:sSubPr>
+                        <m:ctrlPr>
+                          <a:rPr lang="en-US" b="0" i="1" smtClean="0">
+                            <a:latin typeface="Cambria Math" panose="02040503050406030204" pitchFamily="18" charset="0"/>
+                          </a:rPr>
+                        </m:ctrlPr>
+                      </m:sSubPr>
+                      <m:e>
+                        <m:r>
+                          <a:rPr lang="en-US" b="0" i="1" smtClean="0">
+                            <a:latin typeface="Cambria Math" panose="02040503050406030204" pitchFamily="18" charset="0"/>
+                          </a:rPr>
+                          <m:t>𝑝</m:t>
+                        </m:r>
+                      </m:e>
+                      <m:sub>
+                        <m:r>
+                          <a:rPr lang="en-US" b="0" i="1" smtClean="0">
+                            <a:latin typeface="Cambria Math" panose="02040503050406030204" pitchFamily="18" charset="0"/>
+                          </a:rPr>
+                          <m:t>𝑖</m:t>
+                        </m:r>
+                      </m:sub>
+                    </m:sSub>
+                    <m:r>
+                      <a:rPr lang="en-US" b="0" i="1" smtClean="0">
+                        <a:latin typeface="Cambria Math" panose="02040503050406030204" pitchFamily="18" charset="0"/>
+                      </a:rPr>
+                      <m:t>=</m:t>
+                    </m:r>
+                    <m:r>
+                      <a:rPr lang="en-US" b="0" i="1" smtClean="0">
+                        <a:latin typeface="Cambria Math" panose="02040503050406030204" pitchFamily="18" charset="0"/>
+                      </a:rPr>
+                      <m:t>𝑖</m:t>
+                    </m:r>
+                  </m:oMath>
+                </a14:m>
+                <a:r>
+                  <a:rPr lang="en-US" dirty="0"/>
+                  <a:t> , then whenever nodes change their groups update according to</a:t>
+                </a:r>
+              </a:p>
+              <a:p>
+                <a:pPr algn="ctr"/>
+                <a14:m>
+                  <m:oMath xmlns:m="http://schemas.openxmlformats.org/officeDocument/2006/math">
+                    <m:sSub>
+                      <m:sSubPr>
+                        <m:ctrlPr>
+                          <a:rPr lang="en-US" b="0" i="1" smtClean="0">
+                            <a:latin typeface="Cambria Math" panose="02040503050406030204" pitchFamily="18" charset="0"/>
+                          </a:rPr>
+                        </m:ctrlPr>
+                      </m:sSubPr>
+                      <m:e>
+                        <m:r>
+                          <a:rPr lang="en-US" b="0" i="1" smtClean="0">
+                            <a:latin typeface="Cambria Math" panose="02040503050406030204" pitchFamily="18" charset="0"/>
+                          </a:rPr>
+                          <m:t>𝑝</m:t>
+                        </m:r>
+                      </m:e>
+                      <m:sub>
+                        <m:r>
+                          <a:rPr lang="en-US" b="0" i="1" smtClean="0">
+                            <a:latin typeface="Cambria Math" panose="02040503050406030204" pitchFamily="18" charset="0"/>
+                          </a:rPr>
+                          <m:t>𝑖</m:t>
+                        </m:r>
+                      </m:sub>
+                    </m:sSub>
+                    <m:r>
+                      <a:rPr lang="en-US" b="0" i="1" smtClean="0">
+                        <a:latin typeface="Cambria Math" panose="02040503050406030204" pitchFamily="18" charset="0"/>
+                      </a:rPr>
+                      <m:t>=</m:t>
+                    </m:r>
+                    <m:nary>
+                      <m:naryPr>
+                        <m:chr m:val="∑"/>
+                        <m:supHide m:val="on"/>
+                        <m:ctrlPr>
+                          <a:rPr lang="en-US" b="0" i="1" smtClean="0">
+                            <a:latin typeface="Cambria Math" panose="02040503050406030204" pitchFamily="18" charset="0"/>
+                          </a:rPr>
+                        </m:ctrlPr>
+                      </m:naryPr>
+                      <m:sub>
+                        <m:r>
+                          <a:rPr lang="en-US" b="0" i="1" smtClean="0">
+                            <a:latin typeface="Cambria Math" panose="02040503050406030204" pitchFamily="18" charset="0"/>
+                          </a:rPr>
+                          <m:t>𝑗</m:t>
+                        </m:r>
+                      </m:sub>
+                      <m:sup/>
+                      <m:e>
+                        <m:f>
+                          <m:fPr>
+                            <m:ctrlPr>
+                              <a:rPr lang="en-US" b="0" i="1" smtClean="0">
+                                <a:latin typeface="Cambria Math" panose="02040503050406030204" pitchFamily="18" charset="0"/>
+                              </a:rPr>
+                            </m:ctrlPr>
+                          </m:fPr>
+                          <m:num>
+                            <m:sSub>
+                              <m:sSubPr>
+                                <m:ctrlPr>
+                                  <a:rPr lang="en-US" b="0" i="1" smtClean="0">
+                                    <a:latin typeface="Cambria Math" panose="02040503050406030204" pitchFamily="18" charset="0"/>
+                                  </a:rPr>
+                                </m:ctrlPr>
+                              </m:sSubPr>
+                              <m:e>
+                                <m:r>
+                                  <a:rPr lang="en-US" b="0" i="1" smtClean="0">
+                                    <a:latin typeface="Cambria Math" panose="02040503050406030204" pitchFamily="18" charset="0"/>
+                                  </a:rPr>
+                                  <m:t>𝑝</m:t>
+                                </m:r>
+                              </m:e>
+                              <m:sub>
+                                <m:r>
+                                  <a:rPr lang="en-US" b="0" i="1" smtClean="0">
+                                    <a:latin typeface="Cambria Math" panose="02040503050406030204" pitchFamily="18" charset="0"/>
+                                  </a:rPr>
+                                  <m:t>𝑗</m:t>
+                                </m:r>
+                              </m:sub>
+                            </m:sSub>
+                          </m:num>
+                          <m:den>
+                            <m:sSubSup>
+                              <m:sSubSupPr>
+                                <m:ctrlPr>
+                                  <a:rPr lang="en-US" b="0" i="1" smtClean="0">
+                                    <a:latin typeface="Cambria Math" panose="02040503050406030204" pitchFamily="18" charset="0"/>
+                                  </a:rPr>
+                                </m:ctrlPr>
+                              </m:sSubSupPr>
+                              <m:e>
+                                <m:r>
+                                  <a:rPr lang="en-US" b="0" i="1" smtClean="0">
+                                    <a:latin typeface="Cambria Math" panose="02040503050406030204" pitchFamily="18" charset="0"/>
+                                  </a:rPr>
+                                  <m:t>𝑘</m:t>
+                                </m:r>
+                              </m:e>
+                              <m:sub>
+                                <m:r>
+                                  <a:rPr lang="en-US" b="0" i="1" smtClean="0">
+                                    <a:latin typeface="Cambria Math" panose="02040503050406030204" pitchFamily="18" charset="0"/>
+                                  </a:rPr>
+                                  <m:t>𝑗</m:t>
+                                </m:r>
+                              </m:sub>
+                              <m:sup>
+                                <m:sSub>
+                                  <m:sSubPr>
+                                    <m:ctrlPr>
+                                      <a:rPr lang="en-US" b="0" i="1" smtClean="0">
+                                        <a:latin typeface="Cambria Math" panose="02040503050406030204" pitchFamily="18" charset="0"/>
+                                      </a:rPr>
+                                    </m:ctrlPr>
+                                  </m:sSubPr>
+                                  <m:e>
+                                    <m:r>
+                                      <a:rPr lang="en-US" b="0" i="1" smtClean="0">
+                                        <a:latin typeface="Cambria Math" panose="02040503050406030204" pitchFamily="18" charset="0"/>
+                                      </a:rPr>
+                                      <m:t>𝑔</m:t>
+                                    </m:r>
+                                  </m:e>
+                                  <m:sub>
+                                    <m:r>
+                                      <a:rPr lang="en-US" b="0" i="1" smtClean="0">
+                                        <a:latin typeface="Cambria Math" panose="02040503050406030204" pitchFamily="18" charset="0"/>
+                                      </a:rPr>
+                                      <m:t>𝑗</m:t>
+                                    </m:r>
+                                  </m:sub>
+                                </m:sSub>
+                              </m:sup>
+                            </m:sSubSup>
+                          </m:den>
+                        </m:f>
+                        <m:sSub>
+                          <m:sSubPr>
+                            <m:ctrlPr>
+                              <a:rPr lang="en-US" b="0" i="1" smtClean="0">
+                                <a:latin typeface="Cambria Math" panose="02040503050406030204" pitchFamily="18" charset="0"/>
+                              </a:rPr>
+                            </m:ctrlPr>
+                          </m:sSubPr>
+                          <m:e>
+                            <m:r>
+                              <a:rPr lang="en-US" b="0" i="1" smtClean="0">
+                                <a:latin typeface="Cambria Math" panose="02040503050406030204" pitchFamily="18" charset="0"/>
+                              </a:rPr>
+                              <m:t>𝐴</m:t>
+                            </m:r>
+                          </m:e>
+                          <m:sub>
+                            <m:d>
+                              <m:dPr>
+                                <m:begChr m:val="{"/>
+                                <m:endChr m:val="}"/>
+                                <m:ctrlPr>
+                                  <a:rPr lang="en-US" b="0" i="1" smtClean="0">
+                                    <a:latin typeface="Cambria Math" panose="02040503050406030204" pitchFamily="18" charset="0"/>
+                                  </a:rPr>
+                                </m:ctrlPr>
+                              </m:dPr>
+                              <m:e>
+                                <m:r>
+                                  <a:rPr lang="en-US" b="0" i="1" smtClean="0">
+                                    <a:latin typeface="Cambria Math" panose="02040503050406030204" pitchFamily="18" charset="0"/>
+                                  </a:rPr>
+                                  <m:t>𝑖</m:t>
+                                </m:r>
+                                <m:r>
+                                  <a:rPr lang="en-US" b="0" i="1" smtClean="0">
+                                    <a:latin typeface="Cambria Math" panose="02040503050406030204" pitchFamily="18" charset="0"/>
+                                  </a:rPr>
+                                  <m:t>,</m:t>
+                                </m:r>
+                                <m:r>
+                                  <a:rPr lang="en-US" b="0" i="1" smtClean="0">
+                                    <a:latin typeface="Cambria Math" panose="02040503050406030204" pitchFamily="18" charset="0"/>
+                                  </a:rPr>
+                                  <m:t>𝑗</m:t>
+                                </m:r>
+                              </m:e>
+                            </m:d>
+                          </m:sub>
+                        </m:sSub>
+                        <m:r>
+                          <a:rPr lang="en-US" b="0" i="1" smtClean="0">
+                            <a:latin typeface="Cambria Math" panose="02040503050406030204" pitchFamily="18" charset="0"/>
+                          </a:rPr>
+                          <m:t>𝛿</m:t>
+                        </m:r>
+                        <m:d>
+                          <m:dPr>
+                            <m:ctrlPr>
+                              <a:rPr lang="en-US" b="0" i="1" smtClean="0">
+                                <a:latin typeface="Cambria Math" panose="02040503050406030204" pitchFamily="18" charset="0"/>
+                              </a:rPr>
+                            </m:ctrlPr>
+                          </m:dPr>
+                          <m:e>
+                            <m:sSub>
+                              <m:sSubPr>
+                                <m:ctrlPr>
+                                  <a:rPr lang="en-US" b="0" i="1" smtClean="0">
+                                    <a:latin typeface="Cambria Math" panose="02040503050406030204" pitchFamily="18" charset="0"/>
+                                  </a:rPr>
+                                </m:ctrlPr>
+                              </m:sSubPr>
+                              <m:e>
+                                <m:r>
+                                  <a:rPr lang="en-US" b="0" i="1" smtClean="0">
+                                    <a:latin typeface="Cambria Math" panose="02040503050406030204" pitchFamily="18" charset="0"/>
+                                  </a:rPr>
+                                  <m:t>𝑔</m:t>
+                                </m:r>
+                              </m:e>
+                              <m:sub>
+                                <m:r>
+                                  <a:rPr lang="en-US" b="0" i="1" smtClean="0">
+                                    <a:latin typeface="Cambria Math" panose="02040503050406030204" pitchFamily="18" charset="0"/>
+                                  </a:rPr>
+                                  <m:t>𝑖</m:t>
+                                </m:r>
+                              </m:sub>
+                            </m:sSub>
+                            <m:r>
+                              <a:rPr lang="en-US" b="0" i="1" smtClean="0">
+                                <a:latin typeface="Cambria Math" panose="02040503050406030204" pitchFamily="18" charset="0"/>
+                              </a:rPr>
+                              <m:t>, </m:t>
+                            </m:r>
+                            <m:sSub>
+                              <m:sSubPr>
+                                <m:ctrlPr>
+                                  <a:rPr lang="en-US" b="0" i="1" smtClean="0">
+                                    <a:latin typeface="Cambria Math" panose="02040503050406030204" pitchFamily="18" charset="0"/>
+                                  </a:rPr>
+                                </m:ctrlPr>
+                              </m:sSubPr>
+                              <m:e>
+                                <m:r>
+                                  <a:rPr lang="en-US" b="0" i="1" smtClean="0">
+                                    <a:latin typeface="Cambria Math" panose="02040503050406030204" pitchFamily="18" charset="0"/>
+                                  </a:rPr>
+                                  <m:t>𝑔</m:t>
+                                </m:r>
+                              </m:e>
+                              <m:sub>
+                                <m:r>
+                                  <a:rPr lang="en-US" b="0" i="1" smtClean="0">
+                                    <a:latin typeface="Cambria Math" panose="02040503050406030204" pitchFamily="18" charset="0"/>
+                                  </a:rPr>
+                                  <m:t>𝑗</m:t>
+                                </m:r>
+                              </m:sub>
+                            </m:sSub>
+                          </m:e>
+                        </m:d>
+                      </m:e>
+                    </m:nary>
+                    <m:r>
+                      <a:rPr lang="en-US" b="0" i="1" smtClean="0">
+                        <a:latin typeface="Cambria Math" panose="02040503050406030204" pitchFamily="18" charset="0"/>
+                      </a:rPr>
+                      <m:t> </m:t>
+                    </m:r>
+                  </m:oMath>
+                </a14:m>
+                <a:r>
+                  <a:rPr lang="en-US" dirty="0"/>
+                  <a:t> </a:t>
+                </a:r>
+              </a:p>
+              <a:p>
+                <a:pPr marL="0" indent="0">
+                  <a:buNone/>
+                </a:pPr>
+                <a:r>
+                  <a:rPr lang="en-US" dirty="0"/>
+                  <a:t>This is the probability that a random walker restricted to group </a:t>
+                </a:r>
+                <a14:m>
+                  <m:oMath xmlns:m="http://schemas.openxmlformats.org/officeDocument/2006/math">
+                    <m:sSub>
+                      <m:sSubPr>
+                        <m:ctrlPr>
+                          <a:rPr lang="en-US" b="0" i="1" smtClean="0">
+                            <a:latin typeface="Cambria Math" panose="02040503050406030204" pitchFamily="18" charset="0"/>
+                          </a:rPr>
+                        </m:ctrlPr>
+                      </m:sSubPr>
+                      <m:e>
+                        <m:r>
+                          <a:rPr lang="en-US" b="0" i="1" smtClean="0">
+                            <a:latin typeface="Cambria Math" panose="02040503050406030204" pitchFamily="18" charset="0"/>
+                          </a:rPr>
+                          <m:t>𝑔</m:t>
+                        </m:r>
+                      </m:e>
+                      <m:sub>
+                        <m:r>
+                          <a:rPr lang="en-US" b="0" i="1" smtClean="0">
+                            <a:latin typeface="Cambria Math" panose="02040503050406030204" pitchFamily="18" charset="0"/>
+                          </a:rPr>
+                          <m:t>𝑖</m:t>
+                        </m:r>
+                      </m:sub>
+                    </m:sSub>
+                  </m:oMath>
+                </a14:m>
+                <a:r>
+                  <a:rPr lang="en-US" dirty="0"/>
+                  <a:t> visits node </a:t>
+                </a:r>
+                <a14:m>
+                  <m:oMath xmlns:m="http://schemas.openxmlformats.org/officeDocument/2006/math">
+                    <m:r>
+                      <a:rPr lang="en-US" b="0" i="1" smtClean="0">
+                        <a:latin typeface="Cambria Math" panose="02040503050406030204" pitchFamily="18" charset="0"/>
+                      </a:rPr>
+                      <m:t>𝑖</m:t>
+                    </m:r>
+                  </m:oMath>
+                </a14:m>
+                <a:r>
+                  <a:rPr lang="en-US" dirty="0"/>
+                  <a:t>. </a:t>
+                </a:r>
+              </a:p>
+              <a:p>
+                <a:pPr marL="0" indent="0">
+                  <a:buNone/>
+                </a:pPr>
+                <a:r>
+                  <a:rPr lang="en-US" dirty="0"/>
+                  <a:t>This is defensive propagation as it results in a larger number of groups by increasing the strength of central group nodes and decreasing the strength of border nodes.</a:t>
+                </a:r>
+              </a:p>
+            </p:txBody>
+          </p:sp>
+        </mc:Choice>
+        <mc:Fallback>
+          <p:sp>
+            <p:nvSpPr>
+              <p:cNvPr id="3" name="Content Placeholder 2">
+                <a:extLst>
+                  <a:ext uri="{FF2B5EF4-FFF2-40B4-BE49-F238E27FC236}">
+                    <a16:creationId xmlns:a16="http://schemas.microsoft.com/office/drawing/2014/main" id="{7DEBA29A-54E0-5B48-BB27-DB28A2D1A03C}"/>
+                  </a:ext>
+                </a:extLst>
+              </p:cNvPr>
+              <p:cNvSpPr>
+                <a:spLocks noGrp="1" noRot="1" noChangeAspect="1" noMove="1" noResize="1" noEditPoints="1" noAdjustHandles="1" noChangeArrowheads="1" noChangeShapeType="1" noTextEdit="1"/>
+              </p:cNvSpPr>
+              <p:nvPr>
+                <p:ph idx="1"/>
+              </p:nvPr>
+            </p:nvSpPr>
+            <p:spPr>
+              <a:blipFill>
+                <a:blip r:embed="rId2"/>
+                <a:stretch>
+                  <a:fillRect l="-1175" t="-2208"/>
+                </a:stretch>
+              </a:blipFill>
+            </p:spPr>
+            <p:txBody>
+              <a:bodyPr/>
+              <a:lstStyle/>
+              <a:p>
+                <a:r>
+                  <a:rPr lang="en-US">
+                    <a:noFill/>
+                  </a:rPr>
+                  <a:t> </a:t>
+                </a:r>
+              </a:p>
+            </p:txBody>
+          </p:sp>
+        </mc:Fallback>
+      </mc:AlternateContent>
+    </p:spTree>
+    <p:extLst>
+      <p:ext uri="{BB962C8B-B14F-4D97-AF65-F5344CB8AC3E}">
+        <p14:creationId xmlns:p14="http://schemas.microsoft.com/office/powerpoint/2010/main" val="2919975405"/>
+      </p:ext>
+    </p:extLst>
+  </p:cSld>
+  <p:clrMapOvr>
+    <a:masterClrMapping/>
+  </p:clrMapOvr>
+</p:sld>
+</file>
+
+<file path=ppt/slides/slide15.xml><?xml version="1.0" encoding="utf-8"?>
+<p:sld xmlns:a="http://schemas.openxmlformats.org/drawingml/2006/main" xmlns:r="http://schemas.openxmlformats.org/officeDocument/2006/relationships" xmlns:p="http://schemas.openxmlformats.org/presentationml/2006/main">
+  <p:cSld>
+    <p:spTree>
+      <p:nvGrpSpPr>
+        <p:cNvPr id="1" name=""/>
+        <p:cNvGrpSpPr/>
+        <p:nvPr/>
+      </p:nvGrpSpPr>
+      <p:grpSpPr>
+        <a:xfrm>
+          <a:off x="0" y="0"/>
+          <a:ext cx="0" cy="0"/>
+          <a:chOff x="0" y="0"/>
+          <a:chExt cx="0" cy="0"/>
+        </a:xfrm>
+      </p:grpSpPr>
+      <p:sp>
+        <p:nvSpPr>
+          <p:cNvPr id="2" name="Title 1">
+            <a:extLst>
+              <a:ext uri="{FF2B5EF4-FFF2-40B4-BE49-F238E27FC236}">
+                <a16:creationId xmlns:a16="http://schemas.microsoft.com/office/drawing/2014/main" id="{75B96373-CBC8-EA4A-825C-53FA23D033E6}"/>
+              </a:ext>
+            </a:extLst>
+          </p:cNvPr>
+          <p:cNvSpPr>
+            <a:spLocks noGrp="1"/>
+          </p:cNvSpPr>
+          <p:nvPr>
+            <p:ph type="title"/>
+          </p:nvPr>
+        </p:nvSpPr>
+        <p:spPr/>
+        <p:txBody>
+          <a:bodyPr/>
+          <a:lstStyle/>
+          <a:p>
+            <a:r>
+              <a:rPr lang="en-US" dirty="0"/>
+              <a:t>Offensive Propagation</a:t>
+            </a:r>
+          </a:p>
+        </p:txBody>
+      </p:sp>
+      <mc:AlternateContent xmlns:mc="http://schemas.openxmlformats.org/markup-compatibility/2006">
+        <mc:Choice xmlns:a14="http://schemas.microsoft.com/office/drawing/2010/main" Requires="a14">
+          <p:sp>
+            <p:nvSpPr>
+              <p:cNvPr id="3" name="Content Placeholder 2">
+                <a:extLst>
+                  <a:ext uri="{FF2B5EF4-FFF2-40B4-BE49-F238E27FC236}">
+                    <a16:creationId xmlns:a16="http://schemas.microsoft.com/office/drawing/2014/main" id="{7BA1C213-F698-6043-8EA1-87FC0B786AFB}"/>
+                  </a:ext>
+                </a:extLst>
+              </p:cNvPr>
+              <p:cNvSpPr>
+                <a:spLocks noGrp="1"/>
+              </p:cNvSpPr>
+              <p:nvPr>
+                <p:ph idx="1"/>
+              </p:nvPr>
+            </p:nvSpPr>
+            <p:spPr/>
+            <p:txBody>
+              <a:bodyPr/>
+              <a:lstStyle/>
+              <a:p>
+                <a:r>
+                  <a:rPr lang="en-US" dirty="0"/>
+                  <a:t>An alternative approach to defensive propagation is offensive propagation. This results in a smaller number of larger groups. The update rule for offensive propagation is written as</a:t>
+                </a:r>
+              </a:p>
+              <a:p>
+                <a:pPr algn="ctr"/>
+                <a14:m>
+                  <m:oMath xmlns:m="http://schemas.openxmlformats.org/officeDocument/2006/math">
+                    <m:sSub>
+                      <m:sSubPr>
+                        <m:ctrlPr>
+                          <a:rPr lang="en-US" i="1">
+                            <a:latin typeface="Cambria Math" panose="02040503050406030204" pitchFamily="18" charset="0"/>
+                          </a:rPr>
+                        </m:ctrlPr>
+                      </m:sSubPr>
+                      <m:e>
+                        <m:r>
+                          <a:rPr lang="en-US" i="1">
+                            <a:latin typeface="Cambria Math" panose="02040503050406030204" pitchFamily="18" charset="0"/>
+                          </a:rPr>
+                          <m:t>𝑔</m:t>
+                        </m:r>
+                      </m:e>
+                      <m:sub>
+                        <m:r>
+                          <a:rPr lang="en-US" i="1">
+                            <a:latin typeface="Cambria Math" panose="02040503050406030204" pitchFamily="18" charset="0"/>
+                          </a:rPr>
+                          <m:t>𝑖</m:t>
+                        </m:r>
+                      </m:sub>
+                    </m:sSub>
+                    <m:r>
+                      <a:rPr lang="en-US" i="1">
+                        <a:latin typeface="Cambria Math" panose="02040503050406030204" pitchFamily="18" charset="0"/>
+                      </a:rPr>
+                      <m:t>=</m:t>
+                    </m:r>
+                    <m:r>
+                      <a:rPr lang="en-US" i="1">
+                        <a:latin typeface="Cambria Math" panose="02040503050406030204" pitchFamily="18" charset="0"/>
+                      </a:rPr>
+                      <m:t>𝑎𝑟𝑔𝑚𝑎</m:t>
+                    </m:r>
+                    <m:sSub>
+                      <m:sSubPr>
+                        <m:ctrlPr>
+                          <a:rPr lang="en-US" i="1">
+                            <a:latin typeface="Cambria Math" panose="02040503050406030204" pitchFamily="18" charset="0"/>
+                          </a:rPr>
+                        </m:ctrlPr>
+                      </m:sSubPr>
+                      <m:e>
+                        <m:r>
+                          <a:rPr lang="en-US" i="1">
+                            <a:latin typeface="Cambria Math" panose="02040503050406030204" pitchFamily="18" charset="0"/>
+                          </a:rPr>
+                          <m:t>𝑥</m:t>
+                        </m:r>
+                      </m:e>
+                      <m:sub>
+                        <m:r>
+                          <a:rPr lang="en-US" i="1">
+                            <a:latin typeface="Cambria Math" panose="02040503050406030204" pitchFamily="18" charset="0"/>
+                          </a:rPr>
+                          <m:t>𝑔</m:t>
+                        </m:r>
+                      </m:sub>
+                    </m:sSub>
+                    <m:nary>
+                      <m:naryPr>
+                        <m:chr m:val="∑"/>
+                        <m:supHide m:val="on"/>
+                        <m:ctrlPr>
+                          <a:rPr lang="en-US" i="1">
+                            <a:latin typeface="Cambria Math" panose="02040503050406030204" pitchFamily="18" charset="0"/>
+                          </a:rPr>
+                        </m:ctrlPr>
+                      </m:naryPr>
+                      <m:sub>
+                        <m:r>
+                          <a:rPr lang="en-US" i="1">
+                            <a:latin typeface="Cambria Math" panose="02040503050406030204" pitchFamily="18" charset="0"/>
+                          </a:rPr>
+                          <m:t>𝑗</m:t>
+                        </m:r>
+                      </m:sub>
+                      <m:sup/>
+                      <m:e>
+                        <m:r>
+                          <a:rPr lang="en-US" b="0" i="1" smtClean="0">
+                            <a:latin typeface="Cambria Math" panose="02040503050406030204" pitchFamily="18" charset="0"/>
+                          </a:rPr>
+                          <m:t>(1−</m:t>
+                        </m:r>
+                        <m:sSub>
+                          <m:sSubPr>
+                            <m:ctrlPr>
+                              <a:rPr lang="en-US" i="1">
+                                <a:latin typeface="Cambria Math" panose="02040503050406030204" pitchFamily="18" charset="0"/>
+                              </a:rPr>
+                            </m:ctrlPr>
+                          </m:sSubPr>
+                          <m:e>
+                            <m:r>
+                              <a:rPr lang="en-US" i="1">
+                                <a:latin typeface="Cambria Math" panose="02040503050406030204" pitchFamily="18" charset="0"/>
+                              </a:rPr>
+                              <m:t>𝑝</m:t>
+                            </m:r>
+                          </m:e>
+                          <m:sub>
+                            <m:r>
+                              <a:rPr lang="en-US" i="1">
+                                <a:latin typeface="Cambria Math" panose="02040503050406030204" pitchFamily="18" charset="0"/>
+                              </a:rPr>
+                              <m:t>𝑗</m:t>
+                            </m:r>
+                          </m:sub>
+                        </m:sSub>
+                        <m:r>
+                          <a:rPr lang="en-US" b="0" i="1" smtClean="0">
+                            <a:latin typeface="Cambria Math" panose="02040503050406030204" pitchFamily="18" charset="0"/>
+                          </a:rPr>
+                          <m:t>)</m:t>
+                        </m:r>
+                        <m:sSub>
+                          <m:sSubPr>
+                            <m:ctrlPr>
+                              <a:rPr lang="en-US" i="1">
+                                <a:latin typeface="Cambria Math" panose="02040503050406030204" pitchFamily="18" charset="0"/>
+                              </a:rPr>
+                            </m:ctrlPr>
+                          </m:sSubPr>
+                          <m:e>
+                            <m:r>
+                              <a:rPr lang="en-US" i="1">
+                                <a:latin typeface="Cambria Math" panose="02040503050406030204" pitchFamily="18" charset="0"/>
+                              </a:rPr>
+                              <m:t>𝐴</m:t>
+                            </m:r>
+                          </m:e>
+                          <m:sub>
+                            <m:d>
+                              <m:dPr>
+                                <m:begChr m:val="{"/>
+                                <m:endChr m:val="}"/>
+                                <m:ctrlPr>
+                                  <a:rPr lang="en-US" i="1">
+                                    <a:latin typeface="Cambria Math" panose="02040503050406030204" pitchFamily="18" charset="0"/>
+                                  </a:rPr>
+                                </m:ctrlPr>
+                              </m:dPr>
+                              <m:e>
+                                <m:r>
+                                  <a:rPr lang="en-US" i="1">
+                                    <a:latin typeface="Cambria Math" panose="02040503050406030204" pitchFamily="18" charset="0"/>
+                                  </a:rPr>
+                                  <m:t>𝑖</m:t>
+                                </m:r>
+                                <m:r>
+                                  <a:rPr lang="en-US" i="1">
+                                    <a:latin typeface="Cambria Math" panose="02040503050406030204" pitchFamily="18" charset="0"/>
+                                  </a:rPr>
+                                  <m:t>,</m:t>
+                                </m:r>
+                                <m:r>
+                                  <a:rPr lang="en-US" i="1">
+                                    <a:latin typeface="Cambria Math" panose="02040503050406030204" pitchFamily="18" charset="0"/>
+                                  </a:rPr>
+                                  <m:t>𝑗</m:t>
+                                </m:r>
+                              </m:e>
+                            </m:d>
+                          </m:sub>
+                        </m:sSub>
+                        <m:r>
+                          <a:rPr lang="en-US" i="1">
+                            <a:latin typeface="Cambria Math" panose="02040503050406030204" pitchFamily="18" charset="0"/>
+                          </a:rPr>
+                          <m:t>𝛿</m:t>
+                        </m:r>
+                        <m:r>
+                          <a:rPr lang="en-US" i="1">
+                            <a:latin typeface="Cambria Math" panose="02040503050406030204" pitchFamily="18" charset="0"/>
+                          </a:rPr>
+                          <m:t>(</m:t>
+                        </m:r>
+                        <m:sSub>
+                          <m:sSubPr>
+                            <m:ctrlPr>
+                              <a:rPr lang="en-US" i="1">
+                                <a:latin typeface="Cambria Math" panose="02040503050406030204" pitchFamily="18" charset="0"/>
+                              </a:rPr>
+                            </m:ctrlPr>
+                          </m:sSubPr>
+                          <m:e>
+                            <m:r>
+                              <a:rPr lang="en-US" i="1">
+                                <a:latin typeface="Cambria Math" panose="02040503050406030204" pitchFamily="18" charset="0"/>
+                              </a:rPr>
+                              <m:t>𝑔</m:t>
+                            </m:r>
+                          </m:e>
+                          <m:sub>
+                            <m:r>
+                              <a:rPr lang="en-US" i="1">
+                                <a:latin typeface="Cambria Math" panose="02040503050406030204" pitchFamily="18" charset="0"/>
+                              </a:rPr>
+                              <m:t>𝑖</m:t>
+                            </m:r>
+                          </m:sub>
+                        </m:sSub>
+                        <m:r>
+                          <a:rPr lang="en-US" i="1">
+                            <a:latin typeface="Cambria Math" panose="02040503050406030204" pitchFamily="18" charset="0"/>
+                          </a:rPr>
+                          <m:t>, </m:t>
+                        </m:r>
+                        <m:sSub>
+                          <m:sSubPr>
+                            <m:ctrlPr>
+                              <a:rPr lang="en-US" i="1">
+                                <a:latin typeface="Cambria Math" panose="02040503050406030204" pitchFamily="18" charset="0"/>
+                              </a:rPr>
+                            </m:ctrlPr>
+                          </m:sSubPr>
+                          <m:e>
+                            <m:r>
+                              <a:rPr lang="en-US" i="1">
+                                <a:latin typeface="Cambria Math" panose="02040503050406030204" pitchFamily="18" charset="0"/>
+                              </a:rPr>
+                              <m:t>𝑔</m:t>
+                            </m:r>
+                          </m:e>
+                          <m:sub>
+                            <m:r>
+                              <a:rPr lang="en-US" i="1">
+                                <a:latin typeface="Cambria Math" panose="02040503050406030204" pitchFamily="18" charset="0"/>
+                              </a:rPr>
+                              <m:t>𝑗</m:t>
+                            </m:r>
+                          </m:sub>
+                        </m:sSub>
+                        <m:r>
+                          <a:rPr lang="en-US" i="1">
+                            <a:latin typeface="Cambria Math" panose="02040503050406030204" pitchFamily="18" charset="0"/>
+                          </a:rPr>
+                          <m:t>)</m:t>
+                        </m:r>
+                      </m:e>
+                    </m:nary>
+                  </m:oMath>
+                </a14:m>
+                <a:endParaRPr lang="en-US" dirty="0"/>
+              </a:p>
+              <a:p>
+                <a:r>
+                  <a:rPr lang="en-US" dirty="0"/>
+                  <a:t>With the same </a:t>
+                </a:r>
+                <a14:m>
+                  <m:oMath xmlns:m="http://schemas.openxmlformats.org/officeDocument/2006/math">
+                    <m:sSub>
+                      <m:sSubPr>
+                        <m:ctrlPr>
+                          <a:rPr lang="en-US" b="0" i="1" smtClean="0">
+                            <a:latin typeface="Cambria Math" panose="02040503050406030204" pitchFamily="18" charset="0"/>
+                          </a:rPr>
+                        </m:ctrlPr>
+                      </m:sSubPr>
+                      <m:e>
+                        <m:r>
+                          <a:rPr lang="en-US" b="0" i="1" smtClean="0">
+                            <a:latin typeface="Cambria Math" panose="02040503050406030204" pitchFamily="18" charset="0"/>
+                          </a:rPr>
+                          <m:t>𝑝</m:t>
+                        </m:r>
+                      </m:e>
+                      <m:sub>
+                        <m:r>
+                          <a:rPr lang="en-US" b="0" i="1" smtClean="0">
+                            <a:latin typeface="Cambria Math" panose="02040503050406030204" pitchFamily="18" charset="0"/>
+                          </a:rPr>
+                          <m:t>𝑗</m:t>
+                        </m:r>
+                      </m:sub>
+                    </m:sSub>
+                  </m:oMath>
+                </a14:m>
+                <a:r>
+                  <a:rPr lang="en-US" dirty="0"/>
+                  <a:t>, definition as defensive propagation mentioned in the previous slide.</a:t>
+                </a:r>
+              </a:p>
+              <a:p>
+                <a:pPr algn="ctr"/>
+                <a:endParaRPr lang="en-US" dirty="0"/>
+              </a:p>
+            </p:txBody>
+          </p:sp>
+        </mc:Choice>
+        <mc:Fallback>
+          <p:sp>
+            <p:nvSpPr>
+              <p:cNvPr id="3" name="Content Placeholder 2">
+                <a:extLst>
+                  <a:ext uri="{FF2B5EF4-FFF2-40B4-BE49-F238E27FC236}">
+                    <a16:creationId xmlns:a16="http://schemas.microsoft.com/office/drawing/2014/main" id="{7BA1C213-F698-6043-8EA1-87FC0B786AFB}"/>
+                  </a:ext>
+                </a:extLst>
+              </p:cNvPr>
+              <p:cNvSpPr>
+                <a:spLocks noGrp="1" noRot="1" noChangeAspect="1" noMove="1" noResize="1" noEditPoints="1" noAdjustHandles="1" noChangeArrowheads="1" noChangeShapeType="1" noTextEdit="1"/>
+              </p:cNvSpPr>
+              <p:nvPr>
+                <p:ph idx="1"/>
+              </p:nvPr>
+            </p:nvSpPr>
+            <p:spPr>
+              <a:blipFill>
+                <a:blip r:embed="rId2"/>
+                <a:stretch>
+                  <a:fillRect l="-261" t="-2208"/>
+                </a:stretch>
+              </a:blipFill>
+            </p:spPr>
+            <p:txBody>
+              <a:bodyPr/>
+              <a:lstStyle/>
+              <a:p>
+                <a:r>
+                  <a:rPr lang="en-US">
+                    <a:noFill/>
+                  </a:rPr>
+                  <a:t> </a:t>
+                </a:r>
+              </a:p>
+            </p:txBody>
+          </p:sp>
+        </mc:Fallback>
+      </mc:AlternateContent>
+      <p:pic>
+        <p:nvPicPr>
+          <p:cNvPr id="5" name="Picture 4">
+            <a:extLst>
+              <a:ext uri="{FF2B5EF4-FFF2-40B4-BE49-F238E27FC236}">
+                <a16:creationId xmlns:a16="http://schemas.microsoft.com/office/drawing/2014/main" id="{949CED86-B542-5F4C-BB9F-93B60EFCA7AE}"/>
+              </a:ext>
+            </a:extLst>
+          </p:cNvPr>
+          <p:cNvPicPr>
+            <a:picLocks noChangeAspect="1"/>
+          </p:cNvPicPr>
+          <p:nvPr/>
+        </p:nvPicPr>
+        <p:blipFill>
+          <a:blip r:embed="rId3"/>
+          <a:stretch>
+            <a:fillRect/>
+          </a:stretch>
+        </p:blipFill>
+        <p:spPr>
+          <a:xfrm>
+            <a:off x="2662956" y="4407491"/>
+            <a:ext cx="6667492" cy="2227727"/>
+          </a:xfrm>
+          <a:prstGeom prst="rect">
+            <a:avLst/>
+          </a:prstGeom>
+        </p:spPr>
+      </p:pic>
+    </p:spTree>
+    <p:extLst>
+      <p:ext uri="{BB962C8B-B14F-4D97-AF65-F5344CB8AC3E}">
+        <p14:creationId xmlns:p14="http://schemas.microsoft.com/office/powerpoint/2010/main" val="3882941864"/>
+      </p:ext>
+    </p:extLst>
+  </p:cSld>
+  <p:clrMapOvr>
+    <a:masterClrMapping/>
+  </p:clrMapOvr>
+</p:sld>
+</file>
+
+<file path=ppt/slides/slide16.xml><?xml version="1.0" encoding="utf-8"?>
+<p:sld xmlns:a="http://schemas.openxmlformats.org/drawingml/2006/main" xmlns:r="http://schemas.openxmlformats.org/officeDocument/2006/relationships" xmlns:p="http://schemas.openxmlformats.org/presentationml/2006/main">
+  <p:cSld>
+    <p:spTree>
+      <p:nvGrpSpPr>
+        <p:cNvPr id="1" name=""/>
+        <p:cNvGrpSpPr/>
+        <p:nvPr/>
+      </p:nvGrpSpPr>
+      <p:grpSpPr>
+        <a:xfrm>
+          <a:off x="0" y="0"/>
+          <a:ext cx="0" cy="0"/>
+          <a:chOff x="0" y="0"/>
+          <a:chExt cx="0" cy="0"/>
+        </a:xfrm>
+      </p:grpSpPr>
+      <p:sp>
+        <p:nvSpPr>
+          <p:cNvPr id="2" name="Title 1">
+            <a:extLst>
+              <a:ext uri="{FF2B5EF4-FFF2-40B4-BE49-F238E27FC236}">
+                <a16:creationId xmlns:a16="http://schemas.microsoft.com/office/drawing/2014/main" id="{525F1F49-3C7A-C347-8B54-FDFB597A2E44}"/>
+              </a:ext>
+            </a:extLst>
+          </p:cNvPr>
+          <p:cNvSpPr>
+            <a:spLocks noGrp="1"/>
+          </p:cNvSpPr>
+          <p:nvPr>
+            <p:ph type="title"/>
+          </p:nvPr>
+        </p:nvSpPr>
+        <p:spPr/>
+        <p:txBody>
+          <a:bodyPr/>
+          <a:lstStyle/>
+          <a:p>
+            <a:r>
+              <a:rPr lang="en-US" dirty="0"/>
+              <a:t>Method Stability and Complexity</a:t>
+            </a:r>
+          </a:p>
+        </p:txBody>
+      </p:sp>
+      <p:sp>
+        <p:nvSpPr>
+          <p:cNvPr id="3" name="Content Placeholder 2">
+            <a:extLst>
+              <a:ext uri="{FF2B5EF4-FFF2-40B4-BE49-F238E27FC236}">
+                <a16:creationId xmlns:a16="http://schemas.microsoft.com/office/drawing/2014/main" id="{BDDF7DD8-1A2A-CF47-8A85-458E4CF909AB}"/>
+              </a:ext>
+            </a:extLst>
+          </p:cNvPr>
+          <p:cNvSpPr>
+            <a:spLocks noGrp="1"/>
+          </p:cNvSpPr>
+          <p:nvPr>
+            <p:ph idx="1"/>
+          </p:nvPr>
+        </p:nvSpPr>
+        <p:spPr>
+          <a:xfrm>
+            <a:off x="1024128" y="1814945"/>
+            <a:ext cx="9720073" cy="4494415"/>
+          </a:xfrm>
+        </p:spPr>
+        <p:txBody>
+          <a:bodyPr>
+            <a:normAutofit/>
+          </a:bodyPr>
+          <a:lstStyle/>
+          <a:p>
+            <a:r>
+              <a:rPr lang="en-US" dirty="0"/>
+              <a:t>Problem: Label propagation is unstable</a:t>
+            </a:r>
+          </a:p>
+          <a:p>
+            <a:r>
+              <a:rPr lang="en-US" dirty="0"/>
+              <a:t>Solution 1: Semi-Synchronous label propagation. </a:t>
+            </a:r>
+          </a:p>
+          <a:p>
+            <a:pPr lvl="1"/>
+            <a:r>
+              <a:rPr lang="en-US" dirty="0"/>
+              <a:t>Color graph: A graph coloring is one such that no two connected nodes share the same color</a:t>
+            </a:r>
+          </a:p>
+          <a:p>
+            <a:pPr lvl="1"/>
+            <a:r>
+              <a:rPr lang="en-US" dirty="0"/>
+              <a:t>Then traverse nodes with different color in random order</a:t>
+            </a:r>
+          </a:p>
+          <a:p>
+            <a:pPr lvl="1"/>
+            <a:r>
+              <a:rPr lang="en-US" dirty="0"/>
+              <a:t>Update same color nodes synchronously</a:t>
+            </a:r>
+          </a:p>
+          <a:p>
+            <a:pPr lvl="2"/>
+            <a:r>
+              <a:rPr lang="en-US" dirty="0"/>
+              <a:t>Convergence can be proven.</a:t>
+            </a:r>
+          </a:p>
+          <a:p>
+            <a:pPr marL="0" indent="0">
+              <a:buNone/>
+            </a:pPr>
+            <a:r>
+              <a:rPr lang="en-US" dirty="0"/>
+              <a:t>Solution 2: Consensus clustering</a:t>
+            </a:r>
+          </a:p>
+          <a:p>
+            <a:pPr lvl="1"/>
+            <a:r>
+              <a:rPr lang="en-US" dirty="0"/>
+              <a:t>Apply label propagation method to network multiple times.</a:t>
+            </a:r>
+          </a:p>
+          <a:p>
+            <a:pPr lvl="1"/>
+            <a:r>
+              <a:rPr lang="en-US" dirty="0"/>
+              <a:t>Construct a weighted consensus graph where weights represent the number of times two nodes were classified into the same community.</a:t>
+            </a:r>
+          </a:p>
+          <a:p>
+            <a:pPr lvl="1"/>
+            <a:r>
+              <a:rPr lang="en-US" dirty="0"/>
+              <a:t>Repeat process on consensus graph.</a:t>
+            </a:r>
+          </a:p>
+          <a:p>
+            <a:pPr lvl="1"/>
+            <a:r>
+              <a:rPr lang="en-US" dirty="0"/>
+              <a:t>Repeat entire process until convergence</a:t>
+            </a:r>
+          </a:p>
+        </p:txBody>
+      </p:sp>
+    </p:spTree>
+    <p:extLst>
+      <p:ext uri="{BB962C8B-B14F-4D97-AF65-F5344CB8AC3E}">
+        <p14:creationId xmlns:p14="http://schemas.microsoft.com/office/powerpoint/2010/main" val="2730423351"/>
+      </p:ext>
+    </p:extLst>
+  </p:cSld>
+  <p:clrMapOvr>
+    <a:masterClrMapping/>
+  </p:clrMapOvr>
+</p:sld>
+</file>
+
+<file path=ppt/slides/slide17.xml><?xml version="1.0" encoding="utf-8"?>
+<p:sld xmlns:a="http://schemas.openxmlformats.org/drawingml/2006/main" xmlns:r="http://schemas.openxmlformats.org/officeDocument/2006/relationships" xmlns:p="http://schemas.openxmlformats.org/presentationml/2006/main">
+  <p:cSld>
+    <p:spTree>
+      <p:nvGrpSpPr>
+        <p:cNvPr id="1" name=""/>
+        <p:cNvGrpSpPr/>
+        <p:nvPr/>
+      </p:nvGrpSpPr>
+      <p:grpSpPr>
+        <a:xfrm>
+          <a:off x="0" y="0"/>
+          <a:ext cx="0" cy="0"/>
+          <a:chOff x="0" y="0"/>
+          <a:chExt cx="0" cy="0"/>
+        </a:xfrm>
+      </p:grpSpPr>
+      <p:sp>
+        <p:nvSpPr>
+          <p:cNvPr id="2" name="Title 1">
+            <a:extLst>
+              <a:ext uri="{FF2B5EF4-FFF2-40B4-BE49-F238E27FC236}">
+                <a16:creationId xmlns:a16="http://schemas.microsoft.com/office/drawing/2014/main" id="{D3D5860E-C563-604A-BC60-4DFBBAA43D8A}"/>
+              </a:ext>
+            </a:extLst>
+          </p:cNvPr>
+          <p:cNvSpPr>
+            <a:spLocks noGrp="1"/>
+          </p:cNvSpPr>
+          <p:nvPr>
+            <p:ph type="title"/>
+          </p:nvPr>
+        </p:nvSpPr>
+        <p:spPr/>
+        <p:txBody>
+          <a:bodyPr/>
+          <a:lstStyle/>
+          <a:p>
+            <a:r>
+              <a:rPr lang="en-US" dirty="0"/>
+              <a:t>Overlapping Groups of Nodes</a:t>
+            </a:r>
+          </a:p>
+        </p:txBody>
+      </p:sp>
+      <p:sp>
+        <p:nvSpPr>
+          <p:cNvPr id="3" name="Content Placeholder 2">
+            <a:extLst>
+              <a:ext uri="{FF2B5EF4-FFF2-40B4-BE49-F238E27FC236}">
+                <a16:creationId xmlns:a16="http://schemas.microsoft.com/office/drawing/2014/main" id="{CB1B200C-6066-4C4A-90DD-2B3232455110}"/>
+              </a:ext>
+            </a:extLst>
+          </p:cNvPr>
+          <p:cNvSpPr>
+            <a:spLocks noGrp="1"/>
+          </p:cNvSpPr>
+          <p:nvPr>
+            <p:ph idx="1"/>
+          </p:nvPr>
+        </p:nvSpPr>
+        <p:spPr/>
+        <p:txBody>
+          <a:bodyPr/>
+          <a:lstStyle/>
+          <a:p>
+            <a:r>
+              <a:rPr lang="en-US" dirty="0"/>
+              <a:t>The label propagation method was originally designed to detect non-overlapping communities </a:t>
+            </a:r>
+            <a:r>
+              <a:rPr lang="en-US"/>
+              <a:t>in networks.</a:t>
+            </a:r>
+          </a:p>
+        </p:txBody>
+      </p:sp>
+    </p:spTree>
+    <p:extLst>
+      <p:ext uri="{BB962C8B-B14F-4D97-AF65-F5344CB8AC3E}">
+        <p14:creationId xmlns:p14="http://schemas.microsoft.com/office/powerpoint/2010/main" val="1919796657"/>
+      </p:ext>
+    </p:extLst>
+  </p:cSld>
+  <p:clrMapOvr>
+    <a:masterClrMapping/>
+  </p:clrMapOvr>
+</p:sld>
+</file>
+
 <file path=ppt/slides/slide2.xml><?xml version="1.0" encoding="utf-8"?>
 <p:sld xmlns:a="http://schemas.openxmlformats.org/drawingml/2006/main" xmlns:r="http://schemas.openxmlformats.org/officeDocument/2006/relationships" xmlns:p="http://schemas.openxmlformats.org/presentationml/2006/main">
   <p:cSld>
@@ -20939,8 +24376,8 @@
           </a:p>
         </p:txBody>
       </p:sp>
-      <mc:AlternateContent xmlns:mc="http://schemas.openxmlformats.org/markup-compatibility/2006">
-        <mc:Choice xmlns:a14="http://schemas.microsoft.com/office/drawing/2010/main" Requires="a14">
+      <mc:AlternateContent xmlns:mc="http://schemas.openxmlformats.org/markup-compatibility/2006" xmlns:a14="http://schemas.microsoft.com/office/drawing/2010/main">
+        <mc:Choice Requires="a14">
           <p:sp>
             <p:nvSpPr>
               <p:cNvPr id="3" name="Content Placeholder 2">
@@ -21438,7 +24875,7 @@
             </p:txBody>
           </p:sp>
         </mc:Choice>
-        <mc:Fallback>
+        <mc:Fallback xmlns="">
           <p:sp>
             <p:nvSpPr>
               <p:cNvPr id="3" name="Content Placeholder 2">
@@ -21536,8 +24973,8 @@
           </a:p>
         </p:txBody>
       </p:sp>
-      <mc:AlternateContent xmlns:mc="http://schemas.openxmlformats.org/markup-compatibility/2006">
-        <mc:Choice xmlns:a14="http://schemas.microsoft.com/office/drawing/2010/main" Requires="a14">
+      <mc:AlternateContent xmlns:mc="http://schemas.openxmlformats.org/markup-compatibility/2006" xmlns:a14="http://schemas.microsoft.com/office/drawing/2010/main">
+        <mc:Choice Requires="a14">
           <p:sp>
             <p:nvSpPr>
               <p:cNvPr id="3" name="Content Placeholder 2">
@@ -22131,7 +25568,7 @@
             </p:txBody>
           </p:sp>
         </mc:Choice>
-        <mc:Fallback>
+        <mc:Fallback xmlns="">
           <p:sp>
             <p:nvSpPr>
               <p:cNvPr id="3" name="Content Placeholder 2">
@@ -22229,8 +25666,8 @@
           </a:p>
         </p:txBody>
       </p:sp>
-      <mc:AlternateContent xmlns:mc="http://schemas.openxmlformats.org/markup-compatibility/2006">
-        <mc:Choice xmlns:a14="http://schemas.microsoft.com/office/drawing/2010/main" Requires="a14">
+      <mc:AlternateContent xmlns:mc="http://schemas.openxmlformats.org/markup-compatibility/2006" xmlns:a14="http://schemas.microsoft.com/office/drawing/2010/main">
+        <mc:Choice Requires="a14">
           <p:sp>
             <p:nvSpPr>
               <p:cNvPr id="3" name="Content Placeholder 2">
@@ -22639,7 +26076,7 @@
             </p:txBody>
           </p:sp>
         </mc:Choice>
-        <mc:Fallback>
+        <mc:Fallback xmlns="">
           <p:sp>
             <p:nvSpPr>
               <p:cNvPr id="3" name="Content Placeholder 2">
@@ -22767,8 +26204,8 @@
           </a:p>
         </p:txBody>
       </p:sp>
-      <mc:AlternateContent xmlns:mc="http://schemas.openxmlformats.org/markup-compatibility/2006">
-        <mc:Choice xmlns:a14="http://schemas.microsoft.com/office/drawing/2010/main" Requires="a14">
+      <mc:AlternateContent xmlns:mc="http://schemas.openxmlformats.org/markup-compatibility/2006" xmlns:a14="http://schemas.microsoft.com/office/drawing/2010/main">
+        <mc:Choice Requires="a14">
           <p:sp>
             <p:nvSpPr>
               <p:cNvPr id="3" name="Content Placeholder 2">
@@ -23147,7 +26584,7 @@
             </p:txBody>
           </p:sp>
         </mc:Choice>
-        <mc:Fallback>
+        <mc:Fallback xmlns="">
           <p:sp>
             <p:nvSpPr>
               <p:cNvPr id="3" name="Content Placeholder 2">
@@ -23632,13 +27069,328 @@
               <a:p>
                 <a:r>
                   <a:rPr lang="en-US" dirty="0"/>
-                  <a:t>We can </a:t>
+                  <a:t>We can define equilibrium to be the state when for every node in a network </a:t>
                 </a:r>
+              </a:p>
+              <a:p>
+                <a:pPr algn="ctr"/>
+                <a14:m>
+                  <m:oMath xmlns:m="http://schemas.openxmlformats.org/officeDocument/2006/math">
+                    <m:sSub>
+                      <m:sSubPr>
+                        <m:ctrlPr>
+                          <a:rPr lang="en-US" b="0" i="1" smtClean="0">
+                            <a:latin typeface="Cambria Math" panose="02040503050406030204" pitchFamily="18" charset="0"/>
+                          </a:rPr>
+                        </m:ctrlPr>
+                      </m:sSubPr>
+                      <m:e>
+                        <m:r>
+                          <a:rPr lang="en-US" b="0" i="1" smtClean="0">
+                            <a:latin typeface="Cambria Math" panose="02040503050406030204" pitchFamily="18" charset="0"/>
+                          </a:rPr>
+                          <m:t>𝑔</m:t>
+                        </m:r>
+                      </m:e>
+                      <m:sub>
+                        <m:r>
+                          <a:rPr lang="en-US" b="0" i="1" smtClean="0">
+                            <a:latin typeface="Cambria Math" panose="02040503050406030204" pitchFamily="18" charset="0"/>
+                          </a:rPr>
+                          <m:t>𝑖</m:t>
+                        </m:r>
+                      </m:sub>
+                    </m:sSub>
+                    <m:r>
+                      <a:rPr lang="en-US" b="0" i="1" smtClean="0">
+                        <a:latin typeface="Cambria Math" panose="02040503050406030204" pitchFamily="18" charset="0"/>
+                      </a:rPr>
+                      <m:t>=</m:t>
+                    </m:r>
+                    <m:r>
+                      <a:rPr lang="en-US" b="0" i="1" smtClean="0">
+                        <a:latin typeface="Cambria Math" panose="02040503050406030204" pitchFamily="18" charset="0"/>
+                      </a:rPr>
+                      <m:t>𝑎𝑟𝑔𝑚𝑎</m:t>
+                    </m:r>
+                    <m:sSub>
+                      <m:sSubPr>
+                        <m:ctrlPr>
+                          <a:rPr lang="en-US" b="0" i="1" smtClean="0">
+                            <a:latin typeface="Cambria Math" panose="02040503050406030204" pitchFamily="18" charset="0"/>
+                          </a:rPr>
+                        </m:ctrlPr>
+                      </m:sSubPr>
+                      <m:e>
+                        <m:r>
+                          <a:rPr lang="en-US" b="0" i="1" smtClean="0">
+                            <a:latin typeface="Cambria Math" panose="02040503050406030204" pitchFamily="18" charset="0"/>
+                          </a:rPr>
+                          <m:t>𝑥</m:t>
+                        </m:r>
+                      </m:e>
+                      <m:sub>
+                        <m:r>
+                          <a:rPr lang="en-US" b="0" i="1" smtClean="0">
+                            <a:latin typeface="Cambria Math" panose="02040503050406030204" pitchFamily="18" charset="0"/>
+                          </a:rPr>
+                          <m:t>𝑔</m:t>
+                        </m:r>
+                      </m:sub>
+                    </m:sSub>
+                    <m:sSubSup>
+                      <m:sSubSupPr>
+                        <m:ctrlPr>
+                          <a:rPr lang="en-US" b="0" i="1" smtClean="0">
+                            <a:latin typeface="Cambria Math" panose="02040503050406030204" pitchFamily="18" charset="0"/>
+                          </a:rPr>
+                        </m:ctrlPr>
+                      </m:sSubSupPr>
+                      <m:e>
+                        <m:r>
+                          <a:rPr lang="en-US" b="0" i="1" smtClean="0">
+                            <a:latin typeface="Cambria Math" panose="02040503050406030204" pitchFamily="18" charset="0"/>
+                          </a:rPr>
+                          <m:t>𝑘</m:t>
+                        </m:r>
+                      </m:e>
+                      <m:sub>
+                        <m:r>
+                          <a:rPr lang="en-US" b="0" i="1" smtClean="0">
+                            <a:latin typeface="Cambria Math" panose="02040503050406030204" pitchFamily="18" charset="0"/>
+                          </a:rPr>
+                          <m:t>𝑖</m:t>
+                        </m:r>
+                      </m:sub>
+                      <m:sup>
+                        <m:r>
+                          <a:rPr lang="en-US" b="0" i="1" smtClean="0">
+                            <a:latin typeface="Cambria Math" panose="02040503050406030204" pitchFamily="18" charset="0"/>
+                          </a:rPr>
+                          <m:t>𝑔</m:t>
+                        </m:r>
+                      </m:sup>
+                    </m:sSubSup>
+                  </m:oMath>
+                </a14:m>
                 <a:r>
-                  <a:rPr lang="en-US"/>
-                  <a:t>define equilibrium to be </a:t>
+                  <a:rPr lang="en-US" dirty="0"/>
+                  <a:t> </a:t>
                 </a:r>
-                <a:endParaRPr lang="en-US" dirty="0"/>
+              </a:p>
+              <a:p>
+                <a:r>
+                  <a:rPr lang="en-US" dirty="0"/>
+                  <a:t>Where </a:t>
+                </a:r>
+                <a14:m>
+                  <m:oMath xmlns:m="http://schemas.openxmlformats.org/officeDocument/2006/math">
+                    <m:sSub>
+                      <m:sSubPr>
+                        <m:ctrlPr>
+                          <a:rPr lang="en-US" b="0" i="1" smtClean="0">
+                            <a:latin typeface="Cambria Math" panose="02040503050406030204" pitchFamily="18" charset="0"/>
+                          </a:rPr>
+                        </m:ctrlPr>
+                      </m:sSubPr>
+                      <m:e>
+                        <m:r>
+                          <a:rPr lang="en-US" b="0" i="1" smtClean="0">
+                            <a:latin typeface="Cambria Math" panose="02040503050406030204" pitchFamily="18" charset="0"/>
+                          </a:rPr>
+                          <m:t>𝑘</m:t>
+                        </m:r>
+                      </m:e>
+                      <m:sub>
+                        <m:r>
+                          <a:rPr lang="en-US" b="0" i="1" smtClean="0">
+                            <a:latin typeface="Cambria Math" panose="02040503050406030204" pitchFamily="18" charset="0"/>
+                          </a:rPr>
+                          <m:t>𝑖</m:t>
+                        </m:r>
+                      </m:sub>
+                    </m:sSub>
+                  </m:oMath>
+                </a14:m>
+                <a:r>
+                  <a:rPr lang="en-US" dirty="0"/>
+                  <a:t> denote the number of neighbors of node </a:t>
+                </a:r>
+                <a14:m>
+                  <m:oMath xmlns:m="http://schemas.openxmlformats.org/officeDocument/2006/math">
+                    <m:r>
+                      <a:rPr lang="en-US" b="0" i="1" smtClean="0">
+                        <a:latin typeface="Cambria Math" panose="02040503050406030204" pitchFamily="18" charset="0"/>
+                      </a:rPr>
+                      <m:t>𝑖</m:t>
+                    </m:r>
+                  </m:oMath>
+                </a14:m>
+                <a:r>
+                  <a:rPr lang="en-US" dirty="0"/>
+                  <a:t> and </a:t>
+                </a:r>
+                <a14:m>
+                  <m:oMath xmlns:m="http://schemas.openxmlformats.org/officeDocument/2006/math">
+                    <m:sSubSup>
+                      <m:sSubSupPr>
+                        <m:ctrlPr>
+                          <a:rPr lang="en-US" b="0" i="1" smtClean="0">
+                            <a:latin typeface="Cambria Math" panose="02040503050406030204" pitchFamily="18" charset="0"/>
+                          </a:rPr>
+                        </m:ctrlPr>
+                      </m:sSubSupPr>
+                      <m:e>
+                        <m:r>
+                          <a:rPr lang="en-US" b="0" i="1" smtClean="0">
+                            <a:latin typeface="Cambria Math" panose="02040503050406030204" pitchFamily="18" charset="0"/>
+                          </a:rPr>
+                          <m:t>𝑘</m:t>
+                        </m:r>
+                      </m:e>
+                      <m:sub>
+                        <m:r>
+                          <a:rPr lang="en-US" b="0" i="1" smtClean="0">
+                            <a:latin typeface="Cambria Math" panose="02040503050406030204" pitchFamily="18" charset="0"/>
+                          </a:rPr>
+                          <m:t>𝑖</m:t>
+                        </m:r>
+                      </m:sub>
+                      <m:sup>
+                        <m:r>
+                          <a:rPr lang="en-US" b="0" i="1" smtClean="0">
+                            <a:latin typeface="Cambria Math" panose="02040503050406030204" pitchFamily="18" charset="0"/>
+                          </a:rPr>
+                          <m:t>𝑔</m:t>
+                        </m:r>
+                      </m:sup>
+                    </m:sSubSup>
+                  </m:oMath>
+                </a14:m>
+                <a:r>
+                  <a:rPr lang="en-US" dirty="0"/>
+                  <a:t> the number of neighbors that share label g. Thus equilibrium is when </a:t>
+                </a:r>
+              </a:p>
+              <a:p>
+                <a:pPr algn="ctr"/>
+                <a14:m>
+                  <m:oMath xmlns:m="http://schemas.openxmlformats.org/officeDocument/2006/math">
+                    <m:r>
+                      <a:rPr lang="en-US" b="0" i="1" smtClean="0">
+                        <a:latin typeface="Cambria Math" panose="02040503050406030204" pitchFamily="18" charset="0"/>
+                      </a:rPr>
+                      <m:t>∀</m:t>
+                    </m:r>
+                    <m:r>
+                      <a:rPr lang="en-US" b="0" i="1" smtClean="0">
+                        <a:latin typeface="Cambria Math" panose="02040503050406030204" pitchFamily="18" charset="0"/>
+                      </a:rPr>
+                      <m:t>𝑔</m:t>
+                    </m:r>
+                    <m:r>
+                      <a:rPr lang="en-US" b="0" i="1" smtClean="0">
+                        <a:latin typeface="Cambria Math" panose="02040503050406030204" pitchFamily="18" charset="0"/>
+                      </a:rPr>
+                      <m:t> :</m:t>
+                    </m:r>
+                    <m:sSubSup>
+                      <m:sSubSupPr>
+                        <m:ctrlPr>
+                          <a:rPr lang="en-US" b="0" i="1" smtClean="0">
+                            <a:latin typeface="Cambria Math" panose="02040503050406030204" pitchFamily="18" charset="0"/>
+                          </a:rPr>
+                        </m:ctrlPr>
+                      </m:sSubSupPr>
+                      <m:e>
+                        <m:r>
+                          <a:rPr lang="en-US" b="0" i="1" smtClean="0">
+                            <a:latin typeface="Cambria Math" panose="02040503050406030204" pitchFamily="18" charset="0"/>
+                          </a:rPr>
+                          <m:t>𝑘</m:t>
+                        </m:r>
+                      </m:e>
+                      <m:sub>
+                        <m:r>
+                          <a:rPr lang="en-US" b="0" i="1" smtClean="0">
+                            <a:latin typeface="Cambria Math" panose="02040503050406030204" pitchFamily="18" charset="0"/>
+                          </a:rPr>
+                          <m:t>𝑖</m:t>
+                        </m:r>
+                      </m:sub>
+                      <m:sup>
+                        <m:sSub>
+                          <m:sSubPr>
+                            <m:ctrlPr>
+                              <a:rPr lang="en-US" b="0" i="1" smtClean="0">
+                                <a:latin typeface="Cambria Math" panose="02040503050406030204" pitchFamily="18" charset="0"/>
+                              </a:rPr>
+                            </m:ctrlPr>
+                          </m:sSubPr>
+                          <m:e>
+                            <m:r>
+                              <a:rPr lang="en-US" b="0" i="1" smtClean="0">
+                                <a:latin typeface="Cambria Math" panose="02040503050406030204" pitchFamily="18" charset="0"/>
+                              </a:rPr>
+                              <m:t>𝑔</m:t>
+                            </m:r>
+                          </m:e>
+                          <m:sub>
+                            <m:r>
+                              <a:rPr lang="en-US" b="0" i="1" smtClean="0">
+                                <a:latin typeface="Cambria Math" panose="02040503050406030204" pitchFamily="18" charset="0"/>
+                              </a:rPr>
+                              <m:t>𝑖</m:t>
+                            </m:r>
+                          </m:sub>
+                        </m:sSub>
+                      </m:sup>
+                    </m:sSubSup>
+                    <m:r>
+                      <a:rPr lang="en-US" b="0" i="1" smtClean="0">
+                        <a:latin typeface="Cambria Math" panose="02040503050406030204" pitchFamily="18" charset="0"/>
+                      </a:rPr>
+                      <m:t>≥</m:t>
+                    </m:r>
+                    <m:sSubSup>
+                      <m:sSubSupPr>
+                        <m:ctrlPr>
+                          <a:rPr lang="en-US" b="0" i="1" smtClean="0">
+                            <a:latin typeface="Cambria Math" panose="02040503050406030204" pitchFamily="18" charset="0"/>
+                          </a:rPr>
+                        </m:ctrlPr>
+                      </m:sSubSupPr>
+                      <m:e>
+                        <m:r>
+                          <a:rPr lang="en-US" b="0" i="1" smtClean="0">
+                            <a:latin typeface="Cambria Math" panose="02040503050406030204" pitchFamily="18" charset="0"/>
+                          </a:rPr>
+                          <m:t>𝑘</m:t>
+                        </m:r>
+                      </m:e>
+                      <m:sub>
+                        <m:r>
+                          <a:rPr lang="en-US" b="0" i="1" smtClean="0">
+                            <a:latin typeface="Cambria Math" panose="02040503050406030204" pitchFamily="18" charset="0"/>
+                          </a:rPr>
+                          <m:t>𝑖</m:t>
+                        </m:r>
+                      </m:sub>
+                      <m:sup>
+                        <m:r>
+                          <a:rPr lang="en-US" b="0" i="1" smtClean="0">
+                            <a:latin typeface="Cambria Math" panose="02040503050406030204" pitchFamily="18" charset="0"/>
+                          </a:rPr>
+                          <m:t>𝑔</m:t>
+                        </m:r>
+                      </m:sup>
+                    </m:sSubSup>
+                  </m:oMath>
+                </a14:m>
+                <a:r>
+                  <a:rPr lang="en-US" dirty="0"/>
+                  <a:t> </a:t>
+                </a:r>
               </a:p>
             </p:txBody>
           </p:sp>
@@ -23687,6 +27439,629 @@
     <p:extLst>
       <p:ext uri="{BB962C8B-B14F-4D97-AF65-F5344CB8AC3E}">
         <p14:creationId xmlns:p14="http://schemas.microsoft.com/office/powerpoint/2010/main" val="1741744972"/>
+      </p:ext>
+    </p:extLst>
+  </p:cSld>
+  <p:clrMapOvr>
+    <a:masterClrMapping/>
+  </p:clrMapOvr>
+</p:sld>
+</file>
+
+<file path=ppt/slides/slide8.xml><?xml version="1.0" encoding="utf-8"?>
+<p:sld xmlns:a="http://schemas.openxmlformats.org/drawingml/2006/main" xmlns:r="http://schemas.openxmlformats.org/officeDocument/2006/relationships" xmlns:p="http://schemas.openxmlformats.org/presentationml/2006/main">
+  <p:cSld>
+    <p:spTree>
+      <p:nvGrpSpPr>
+        <p:cNvPr id="1" name=""/>
+        <p:cNvGrpSpPr/>
+        <p:nvPr/>
+      </p:nvGrpSpPr>
+      <p:grpSpPr>
+        <a:xfrm>
+          <a:off x="0" y="0"/>
+          <a:ext cx="0" cy="0"/>
+          <a:chOff x="0" y="0"/>
+          <a:chExt cx="0" cy="0"/>
+        </a:xfrm>
+      </p:grpSpPr>
+      <p:sp>
+        <p:nvSpPr>
+          <p:cNvPr id="2" name="Title 1">
+            <a:extLst>
+              <a:ext uri="{FF2B5EF4-FFF2-40B4-BE49-F238E27FC236}">
+                <a16:creationId xmlns:a16="http://schemas.microsoft.com/office/drawing/2014/main" id="{6D5C88D0-E370-0C4A-94C3-169830EB8191}"/>
+              </a:ext>
+            </a:extLst>
+          </p:cNvPr>
+          <p:cNvSpPr>
+            <a:spLocks noGrp="1"/>
+          </p:cNvSpPr>
+          <p:nvPr>
+            <p:ph type="title"/>
+          </p:nvPr>
+        </p:nvSpPr>
+        <p:spPr/>
+        <p:txBody>
+          <a:bodyPr/>
+          <a:lstStyle/>
+          <a:p>
+            <a:r>
+              <a:rPr lang="en-US" dirty="0"/>
+              <a:t>Algorithm and Complexity</a:t>
+            </a:r>
+          </a:p>
+        </p:txBody>
+      </p:sp>
+      <p:pic>
+        <p:nvPicPr>
+          <p:cNvPr id="5" name="Content Placeholder 4">
+            <a:extLst>
+              <a:ext uri="{FF2B5EF4-FFF2-40B4-BE49-F238E27FC236}">
+                <a16:creationId xmlns:a16="http://schemas.microsoft.com/office/drawing/2014/main" id="{0E6A8DEF-F195-774A-A7B1-7B98760873D3}"/>
+              </a:ext>
+            </a:extLst>
+          </p:cNvPr>
+          <p:cNvPicPr>
+            <a:picLocks noGrp="1" noChangeAspect="1"/>
+          </p:cNvPicPr>
+          <p:nvPr>
+            <p:ph idx="1"/>
+          </p:nvPr>
+        </p:nvPicPr>
+        <p:blipFill>
+          <a:blip r:embed="rId2"/>
+          <a:stretch>
+            <a:fillRect/>
+          </a:stretch>
+        </p:blipFill>
+        <p:spPr>
+          <a:xfrm>
+            <a:off x="1024128" y="1793172"/>
+            <a:ext cx="7577995" cy="3460617"/>
+          </a:xfrm>
+        </p:spPr>
+      </p:pic>
+      <mc:AlternateContent xmlns:mc="http://schemas.openxmlformats.org/markup-compatibility/2006">
+        <mc:Choice xmlns:a14="http://schemas.microsoft.com/office/drawing/2010/main" Requires="a14">
+          <p:sp>
+            <p:nvSpPr>
+              <p:cNvPr id="6" name="TextBox 5">
+                <a:extLst>
+                  <a:ext uri="{FF2B5EF4-FFF2-40B4-BE49-F238E27FC236}">
+                    <a16:creationId xmlns:a16="http://schemas.microsoft.com/office/drawing/2014/main" id="{2BDFE495-B47F-C244-BC12-7656AE38BED3}"/>
+                  </a:ext>
+                </a:extLst>
+              </p:cNvPr>
+              <p:cNvSpPr txBox="1"/>
+              <p:nvPr/>
+            </p:nvSpPr>
+            <p:spPr>
+              <a:xfrm>
+                <a:off x="8775866" y="1128157"/>
+                <a:ext cx="3051958" cy="5355569"/>
+              </a:xfrm>
+              <a:prstGeom prst="rect">
+                <a:avLst/>
+              </a:prstGeom>
+              <a:noFill/>
+            </p:spPr>
+            <p:txBody>
+              <a:bodyPr wrap="square" rtlCol="0">
+                <a:spAutoFit/>
+              </a:bodyPr>
+              <a:lstStyle/>
+              <a:p>
+                <a:r>
+                  <a:rPr lang="en-US" dirty="0"/>
+                  <a:t>Since </a:t>
+                </a:r>
+                <a14:m>
+                  <m:oMath xmlns:m="http://schemas.openxmlformats.org/officeDocument/2006/math">
+                    <m:nary>
+                      <m:naryPr>
+                        <m:chr m:val="∑"/>
+                        <m:supHide m:val="on"/>
+                        <m:ctrlPr>
+                          <a:rPr lang="en-US" b="0" i="1" smtClean="0">
+                            <a:latin typeface="Cambria Math" panose="02040503050406030204" pitchFamily="18" charset="0"/>
+                          </a:rPr>
+                        </m:ctrlPr>
+                      </m:naryPr>
+                      <m:sub>
+                        <m:r>
+                          <a:rPr lang="en-US" b="0" i="1" smtClean="0">
+                            <a:latin typeface="Cambria Math" panose="02040503050406030204" pitchFamily="18" charset="0"/>
+                          </a:rPr>
+                          <m:t>𝑖</m:t>
+                        </m:r>
+                      </m:sub>
+                      <m:sup/>
+                      <m:e>
+                        <m:sSub>
+                          <m:sSubPr>
+                            <m:ctrlPr>
+                              <a:rPr lang="en-US" b="0" i="1" smtClean="0">
+                                <a:latin typeface="Cambria Math" panose="02040503050406030204" pitchFamily="18" charset="0"/>
+                              </a:rPr>
+                            </m:ctrlPr>
+                          </m:sSubPr>
+                          <m:e>
+                            <m:r>
+                              <a:rPr lang="en-US" b="0" i="1" smtClean="0">
+                                <a:latin typeface="Cambria Math" panose="02040503050406030204" pitchFamily="18" charset="0"/>
+                              </a:rPr>
+                              <m:t>𝑘</m:t>
+                            </m:r>
+                          </m:e>
+                          <m:sub>
+                            <m:r>
+                              <a:rPr lang="en-US" b="0" i="1" smtClean="0">
+                                <a:latin typeface="Cambria Math" panose="02040503050406030204" pitchFamily="18" charset="0"/>
+                              </a:rPr>
+                              <m:t>𝑖</m:t>
+                            </m:r>
+                          </m:sub>
+                        </m:sSub>
+                        <m:r>
+                          <a:rPr lang="en-US" b="0" i="1" smtClean="0">
+                            <a:latin typeface="Cambria Math" panose="02040503050406030204" pitchFamily="18" charset="0"/>
+                          </a:rPr>
+                          <m:t>=2</m:t>
+                        </m:r>
+                        <m:r>
+                          <a:rPr lang="en-US" b="0" i="1" smtClean="0">
+                            <a:latin typeface="Cambria Math" panose="02040503050406030204" pitchFamily="18" charset="0"/>
+                          </a:rPr>
+                          <m:t>𝑚</m:t>
+                        </m:r>
+                      </m:e>
+                    </m:nary>
+                  </m:oMath>
+                </a14:m>
+                <a:r>
+                  <a:rPr lang="en-US" dirty="0"/>
+                  <a:t> , the complexity of an entire iteration of label propagation is </a:t>
+                </a:r>
+                <a14:m>
+                  <m:oMath xmlns:m="http://schemas.openxmlformats.org/officeDocument/2006/math">
+                    <m:r>
+                      <a:rPr lang="en-US" b="0" i="1" smtClean="0">
+                        <a:latin typeface="Cambria Math" panose="02040503050406030204" pitchFamily="18" charset="0"/>
+                      </a:rPr>
+                      <m:t>𝑂</m:t>
+                    </m:r>
+                    <m:r>
+                      <a:rPr lang="en-US" b="0" i="1" smtClean="0">
+                        <a:latin typeface="Cambria Math" panose="02040503050406030204" pitchFamily="18" charset="0"/>
+                      </a:rPr>
+                      <m:t>(</m:t>
+                    </m:r>
+                    <m:r>
+                      <a:rPr lang="en-US" b="0" i="1" smtClean="0">
+                        <a:latin typeface="Cambria Math" panose="02040503050406030204" pitchFamily="18" charset="0"/>
+                      </a:rPr>
+                      <m:t>𝑚</m:t>
+                    </m:r>
+                    <m:r>
+                      <a:rPr lang="en-US" b="0" i="1" smtClean="0">
+                        <a:latin typeface="Cambria Math" panose="02040503050406030204" pitchFamily="18" charset="0"/>
+                      </a:rPr>
+                      <m:t>)</m:t>
+                    </m:r>
+                  </m:oMath>
+                </a14:m>
+                <a:r>
+                  <a:rPr lang="en-US" dirty="0"/>
+                  <a:t>. </a:t>
+                </a:r>
+              </a:p>
+              <a:p>
+                <a:r>
+                  <a:rPr lang="en-US" dirty="0"/>
+                  <a:t>A random order of nodes for asynchronous propagation can be computed in </a:t>
+                </a:r>
+                <a14:m>
+                  <m:oMath xmlns:m="http://schemas.openxmlformats.org/officeDocument/2006/math">
+                    <m:r>
+                      <a:rPr lang="en-US" b="0" i="1" smtClean="0">
+                        <a:latin typeface="Cambria Math" panose="02040503050406030204" pitchFamily="18" charset="0"/>
+                      </a:rPr>
+                      <m:t>𝑂</m:t>
+                    </m:r>
+                    <m:r>
+                      <a:rPr lang="en-US" b="0" i="1" smtClean="0">
+                        <a:latin typeface="Cambria Math" panose="02040503050406030204" pitchFamily="18" charset="0"/>
+                      </a:rPr>
+                      <m:t>(</m:t>
+                    </m:r>
+                    <m:r>
+                      <a:rPr lang="en-US" b="0" i="1" smtClean="0">
+                        <a:latin typeface="Cambria Math" panose="02040503050406030204" pitchFamily="18" charset="0"/>
+                      </a:rPr>
+                      <m:t>𝑛</m:t>
+                    </m:r>
+                    <m:r>
+                      <a:rPr lang="en-US" b="0" i="1" smtClean="0">
+                        <a:latin typeface="Cambria Math" panose="02040503050406030204" pitchFamily="18" charset="0"/>
+                      </a:rPr>
+                      <m:t>)</m:t>
+                    </m:r>
+                  </m:oMath>
+                </a14:m>
+                <a:r>
+                  <a:rPr lang="en-US" dirty="0"/>
+                  <a:t>.</a:t>
+                </a:r>
+              </a:p>
+              <a:p>
+                <a:r>
+                  <a:rPr lang="en-US" dirty="0"/>
+                  <a:t>At the end of label propagation the division into communities can be computed in </a:t>
+                </a:r>
+                <a14:m>
+                  <m:oMath xmlns:m="http://schemas.openxmlformats.org/officeDocument/2006/math">
+                    <m:r>
+                      <a:rPr lang="en-US" b="0" i="1" smtClean="0">
+                        <a:latin typeface="Cambria Math" panose="02040503050406030204" pitchFamily="18" charset="0"/>
+                      </a:rPr>
+                      <m:t>𝑂</m:t>
+                    </m:r>
+                    <m:r>
+                      <a:rPr lang="en-US" b="0" i="1" smtClean="0">
+                        <a:latin typeface="Cambria Math" panose="02040503050406030204" pitchFamily="18" charset="0"/>
+                      </a:rPr>
+                      <m:t>(</m:t>
+                    </m:r>
+                    <m:r>
+                      <a:rPr lang="en-US" b="0" i="1" smtClean="0">
+                        <a:latin typeface="Cambria Math" panose="02040503050406030204" pitchFamily="18" charset="0"/>
+                      </a:rPr>
+                      <m:t>𝑛</m:t>
+                    </m:r>
+                    <m:r>
+                      <a:rPr lang="en-US" b="0" i="1" smtClean="0">
+                        <a:latin typeface="Cambria Math" panose="02040503050406030204" pitchFamily="18" charset="0"/>
+                      </a:rPr>
+                      <m:t>+</m:t>
+                    </m:r>
+                    <m:r>
+                      <a:rPr lang="en-US" b="0" i="1" smtClean="0">
+                        <a:latin typeface="Cambria Math" panose="02040503050406030204" pitchFamily="18" charset="0"/>
+                      </a:rPr>
+                      <m:t>𝑚</m:t>
+                    </m:r>
+                    <m:r>
+                      <a:rPr lang="en-US" b="0" i="1" smtClean="0">
+                        <a:latin typeface="Cambria Math" panose="02040503050406030204" pitchFamily="18" charset="0"/>
+                      </a:rPr>
+                      <m:t>)</m:t>
+                    </m:r>
+                  </m:oMath>
+                </a14:m>
+                <a:r>
+                  <a:rPr lang="en-US" dirty="0"/>
+                  <a:t> .</a:t>
+                </a:r>
+              </a:p>
+              <a:p>
+                <a:r>
+                  <a:rPr lang="en-US" dirty="0"/>
+                  <a:t>Overall complexity is thus </a:t>
+                </a:r>
+                <a14:m>
+                  <m:oMath xmlns:m="http://schemas.openxmlformats.org/officeDocument/2006/math">
+                    <m:r>
+                      <a:rPr lang="en-US" b="0" i="1" smtClean="0">
+                        <a:latin typeface="Cambria Math" panose="02040503050406030204" pitchFamily="18" charset="0"/>
+                      </a:rPr>
+                      <m:t>𝑂</m:t>
+                    </m:r>
+                    <m:r>
+                      <a:rPr lang="en-US" b="0" i="1" smtClean="0">
+                        <a:latin typeface="Cambria Math" panose="02040503050406030204" pitchFamily="18" charset="0"/>
+                      </a:rPr>
+                      <m:t>(</m:t>
+                    </m:r>
+                    <m:r>
+                      <a:rPr lang="en-US" b="0" i="1" smtClean="0">
+                        <a:latin typeface="Cambria Math" panose="02040503050406030204" pitchFamily="18" charset="0"/>
+                      </a:rPr>
+                      <m:t>𝑐𝑛</m:t>
+                    </m:r>
+                    <m:r>
+                      <a:rPr lang="en-US" b="0" i="1" smtClean="0">
+                        <a:latin typeface="Cambria Math" panose="02040503050406030204" pitchFamily="18" charset="0"/>
+                      </a:rPr>
+                      <m:t>+</m:t>
+                    </m:r>
+                    <m:r>
+                      <a:rPr lang="en-US" b="0" i="1" smtClean="0">
+                        <a:latin typeface="Cambria Math" panose="02040503050406030204" pitchFamily="18" charset="0"/>
+                      </a:rPr>
+                      <m:t>𝑐𝑚</m:t>
+                    </m:r>
+                    <m:r>
+                      <a:rPr lang="en-US" b="0" i="1" smtClean="0">
+                        <a:latin typeface="Cambria Math" panose="02040503050406030204" pitchFamily="18" charset="0"/>
+                      </a:rPr>
+                      <m:t>)</m:t>
+                    </m:r>
+                  </m:oMath>
+                </a14:m>
+                <a:r>
+                  <a:rPr lang="en-US" dirty="0"/>
+                  <a:t> where </a:t>
+                </a:r>
+                <a14:m>
+                  <m:oMath xmlns:m="http://schemas.openxmlformats.org/officeDocument/2006/math">
+                    <m:r>
+                      <a:rPr lang="en-US" b="0" i="1" smtClean="0">
+                        <a:latin typeface="Cambria Math" panose="02040503050406030204" pitchFamily="18" charset="0"/>
+                      </a:rPr>
+                      <m:t>𝑐</m:t>
+                    </m:r>
+                  </m:oMath>
+                </a14:m>
+                <a:r>
+                  <a:rPr lang="en-US" dirty="0"/>
+                  <a:t> is the number of iterations. It has been shown experimentally that </a:t>
+                </a:r>
+                <a14:m>
+                  <m:oMath xmlns:m="http://schemas.openxmlformats.org/officeDocument/2006/math">
+                    <m:r>
+                      <a:rPr lang="en-US" b="0" i="1" smtClean="0">
+                        <a:latin typeface="Cambria Math" panose="02040503050406030204" pitchFamily="18" charset="0"/>
+                      </a:rPr>
+                      <m:t>𝑐</m:t>
+                    </m:r>
+                    <m:r>
+                      <a:rPr lang="en-US" b="0" i="1" smtClean="0">
+                        <a:latin typeface="Cambria Math" panose="02040503050406030204" pitchFamily="18" charset="0"/>
+                      </a:rPr>
+                      <m:t> ≈1.0</m:t>
+                    </m:r>
+                    <m:r>
+                      <a:rPr lang="en-US" b="0" i="1" smtClean="0">
+                        <a:latin typeface="Cambria Math" panose="02040503050406030204" pitchFamily="18" charset="0"/>
+                        <a:ea typeface="Cambria Math" panose="02040503050406030204" pitchFamily="18" charset="0"/>
+                      </a:rPr>
+                      <m:t>3</m:t>
+                    </m:r>
+                    <m:sSup>
+                      <m:sSupPr>
+                        <m:ctrlPr>
+                          <a:rPr lang="en-US" b="0" i="1" smtClean="0">
+                            <a:latin typeface="Cambria Math" panose="02040503050406030204" pitchFamily="18" charset="0"/>
+                            <a:ea typeface="Cambria Math" panose="02040503050406030204" pitchFamily="18" charset="0"/>
+                          </a:rPr>
+                        </m:ctrlPr>
+                      </m:sSupPr>
+                      <m:e>
+                        <m:r>
+                          <a:rPr lang="en-US" b="0" i="1" smtClean="0">
+                            <a:latin typeface="Cambria Math" panose="02040503050406030204" pitchFamily="18" charset="0"/>
+                            <a:ea typeface="Cambria Math" panose="02040503050406030204" pitchFamily="18" charset="0"/>
+                          </a:rPr>
+                          <m:t>𝑚</m:t>
+                        </m:r>
+                      </m:e>
+                      <m:sup>
+                        <m:r>
+                          <a:rPr lang="en-US" b="0" i="1" smtClean="0">
+                            <a:latin typeface="Cambria Math" panose="02040503050406030204" pitchFamily="18" charset="0"/>
+                            <a:ea typeface="Cambria Math" panose="02040503050406030204" pitchFamily="18" charset="0"/>
+                          </a:rPr>
+                          <m:t>0.23</m:t>
+                        </m:r>
+                      </m:sup>
+                    </m:sSup>
+                    <m:r>
+                      <a:rPr lang="en-US" b="0" i="1" smtClean="0">
+                        <a:latin typeface="Cambria Math" panose="02040503050406030204" pitchFamily="18" charset="0"/>
+                        <a:ea typeface="Cambria Math" panose="02040503050406030204" pitchFamily="18" charset="0"/>
+                      </a:rPr>
+                      <m:t>.</m:t>
+                    </m:r>
+                  </m:oMath>
+                </a14:m>
+                <a:r>
+                  <a:rPr lang="en-US" dirty="0"/>
+                  <a:t> Thus label propagation is nearly linear in the number of edges of the network, </a:t>
+                </a:r>
+                <a14:m>
+                  <m:oMath xmlns:m="http://schemas.openxmlformats.org/officeDocument/2006/math">
+                    <m:r>
+                      <a:rPr lang="en-US" b="0" i="1" smtClean="0">
+                        <a:latin typeface="Cambria Math" panose="02040503050406030204" pitchFamily="18" charset="0"/>
+                      </a:rPr>
+                      <m:t>𝑂</m:t>
+                    </m:r>
+                    <m:d>
+                      <m:dPr>
+                        <m:ctrlPr>
+                          <a:rPr lang="en-US" b="0" i="1" smtClean="0">
+                            <a:latin typeface="Cambria Math" panose="02040503050406030204" pitchFamily="18" charset="0"/>
+                          </a:rPr>
+                        </m:ctrlPr>
+                      </m:dPr>
+                      <m:e>
+                        <m:sSup>
+                          <m:sSupPr>
+                            <m:ctrlPr>
+                              <a:rPr lang="en-US" b="0" i="1" smtClean="0">
+                                <a:latin typeface="Cambria Math" panose="02040503050406030204" pitchFamily="18" charset="0"/>
+                              </a:rPr>
+                            </m:ctrlPr>
+                          </m:sSupPr>
+                          <m:e>
+                            <m:r>
+                              <a:rPr lang="en-US" b="0" i="1" smtClean="0">
+                                <a:latin typeface="Cambria Math" panose="02040503050406030204" pitchFamily="18" charset="0"/>
+                              </a:rPr>
+                              <m:t>𝑚</m:t>
+                            </m:r>
+                          </m:e>
+                          <m:sup>
+                            <m:r>
+                              <a:rPr lang="en-US" b="0" i="1" smtClean="0">
+                                <a:latin typeface="Cambria Math" panose="02040503050406030204" pitchFamily="18" charset="0"/>
+                              </a:rPr>
+                              <m:t>1.2</m:t>
+                            </m:r>
+                          </m:sup>
+                        </m:sSup>
+                      </m:e>
+                    </m:d>
+                    <m:r>
+                      <a:rPr lang="en-US" b="0" i="1" smtClean="0">
+                        <a:latin typeface="Cambria Math" panose="02040503050406030204" pitchFamily="18" charset="0"/>
+                      </a:rPr>
+                      <m:t>.</m:t>
+                    </m:r>
+                  </m:oMath>
+                </a14:m>
+                <a:endParaRPr lang="en-US" dirty="0"/>
+              </a:p>
+            </p:txBody>
+          </p:sp>
+        </mc:Choice>
+        <mc:Fallback>
+          <p:sp>
+            <p:nvSpPr>
+              <p:cNvPr id="6" name="TextBox 5">
+                <a:extLst>
+                  <a:ext uri="{FF2B5EF4-FFF2-40B4-BE49-F238E27FC236}">
+                    <a16:creationId xmlns:a16="http://schemas.microsoft.com/office/drawing/2014/main" id="{2BDFE495-B47F-C244-BC12-7656AE38BED3}"/>
+                  </a:ext>
+                </a:extLst>
+              </p:cNvPr>
+              <p:cNvSpPr txBox="1">
+                <a:spLocks noRot="1" noChangeAspect="1" noMove="1" noResize="1" noEditPoints="1" noAdjustHandles="1" noChangeArrowheads="1" noChangeShapeType="1" noTextEdit="1"/>
+              </p:cNvSpPr>
+              <p:nvPr/>
+            </p:nvSpPr>
+            <p:spPr>
+              <a:xfrm>
+                <a:off x="8775866" y="1128157"/>
+                <a:ext cx="3051958" cy="5355569"/>
+              </a:xfrm>
+              <a:prstGeom prst="rect">
+                <a:avLst/>
+              </a:prstGeom>
+              <a:blipFill>
+                <a:blip r:embed="rId3"/>
+                <a:stretch>
+                  <a:fillRect l="-1660" t="-7801" r="-2905" b="-709"/>
+                </a:stretch>
+              </a:blipFill>
+            </p:spPr>
+            <p:txBody>
+              <a:bodyPr/>
+              <a:lstStyle/>
+              <a:p>
+                <a:r>
+                  <a:rPr lang="en-US">
+                    <a:noFill/>
+                  </a:rPr>
+                  <a:t> </a:t>
+                </a:r>
+              </a:p>
+            </p:txBody>
+          </p:sp>
+        </mc:Fallback>
+      </mc:AlternateContent>
+    </p:spTree>
+    <p:extLst>
+      <p:ext uri="{BB962C8B-B14F-4D97-AF65-F5344CB8AC3E}">
+        <p14:creationId xmlns:p14="http://schemas.microsoft.com/office/powerpoint/2010/main" val="417366490"/>
+      </p:ext>
+    </p:extLst>
+  </p:cSld>
+  <p:clrMapOvr>
+    <a:masterClrMapping/>
+  </p:clrMapOvr>
+</p:sld>
+</file>
+
+<file path=ppt/slides/slide9.xml><?xml version="1.0" encoding="utf-8"?>
+<p:sld xmlns:a="http://schemas.openxmlformats.org/drawingml/2006/main" xmlns:r="http://schemas.openxmlformats.org/officeDocument/2006/relationships" xmlns:p="http://schemas.openxmlformats.org/presentationml/2006/main">
+  <p:cSld>
+    <p:spTree>
+      <p:nvGrpSpPr>
+        <p:cNvPr id="1" name=""/>
+        <p:cNvGrpSpPr/>
+        <p:nvPr/>
+      </p:nvGrpSpPr>
+      <p:grpSpPr>
+        <a:xfrm>
+          <a:off x="0" y="0"/>
+          <a:ext cx="0" cy="0"/>
+          <a:chOff x="0" y="0"/>
+          <a:chExt cx="0" cy="0"/>
+        </a:xfrm>
+      </p:grpSpPr>
+      <p:sp>
+        <p:nvSpPr>
+          <p:cNvPr id="2" name="Title 1">
+            <a:extLst>
+              <a:ext uri="{FF2B5EF4-FFF2-40B4-BE49-F238E27FC236}">
+                <a16:creationId xmlns:a16="http://schemas.microsoft.com/office/drawing/2014/main" id="{C3F140B6-B722-CC45-B03F-4539E5AEA2D8}"/>
+              </a:ext>
+            </a:extLst>
+          </p:cNvPr>
+          <p:cNvSpPr>
+            <a:spLocks noGrp="1"/>
+          </p:cNvSpPr>
+          <p:nvPr>
+            <p:ph type="title"/>
+          </p:nvPr>
+        </p:nvSpPr>
+        <p:spPr/>
+        <p:txBody>
+          <a:bodyPr/>
+          <a:lstStyle/>
+          <a:p>
+            <a:r>
+              <a:rPr lang="en-US" dirty="0"/>
+              <a:t>Algorithm and Complexity Cont.</a:t>
+            </a:r>
+          </a:p>
+        </p:txBody>
+      </p:sp>
+      <p:pic>
+        <p:nvPicPr>
+          <p:cNvPr id="5" name="Content Placeholder 4">
+            <a:extLst>
+              <a:ext uri="{FF2B5EF4-FFF2-40B4-BE49-F238E27FC236}">
+                <a16:creationId xmlns:a16="http://schemas.microsoft.com/office/drawing/2014/main" id="{135DCA97-A150-A642-B90B-D3C72EB0D805}"/>
+              </a:ext>
+            </a:extLst>
+          </p:cNvPr>
+          <p:cNvPicPr>
+            <a:picLocks noGrp="1" noChangeAspect="1"/>
+          </p:cNvPicPr>
+          <p:nvPr>
+            <p:ph idx="1"/>
+          </p:nvPr>
+        </p:nvPicPr>
+        <p:blipFill>
+          <a:blip r:embed="rId2"/>
+          <a:stretch>
+            <a:fillRect/>
+          </a:stretch>
+        </p:blipFill>
+        <p:spPr>
+          <a:xfrm>
+            <a:off x="1159210" y="2084832"/>
+            <a:ext cx="9449908" cy="3842846"/>
+          </a:xfrm>
+        </p:spPr>
+      </p:pic>
+    </p:spTree>
+    <p:extLst>
+      <p:ext uri="{BB962C8B-B14F-4D97-AF65-F5344CB8AC3E}">
+        <p14:creationId xmlns:p14="http://schemas.microsoft.com/office/powerpoint/2010/main" val="2437866858"/>
       </p:ext>
     </p:extLst>
   </p:cSld>

</xml_diff>